<commit_message>
attempting to add flowchart to read me
</commit_message>
<xml_diff>
--- a/Attempt5_REU_final/Figures/sampling.pptx
+++ b/Attempt5_REU_final/Figures/sampling.pptx
@@ -8,6 +8,8 @@
     <p:sldId id="256" r:id="rId2"/>
     <p:sldId id="257" r:id="rId3"/>
     <p:sldId id="258" r:id="rId4"/>
+    <p:sldId id="260" r:id="rId5"/>
+    <p:sldId id="259" r:id="rId6"/>
   </p:sldIdLst>
   <p:sldSz cx="12192000" cy="6858000"/>
   <p:notesSz cx="6858000" cy="9144000"/>
@@ -261,7 +263,7 @@
           <a:p>
             <a:fld id="{0B1F5AC1-8606-4CD7-AA4E-C724948A05F2}" type="datetimeFigureOut">
               <a:rPr lang="en-US" smtClean="0"/>
-              <a:t>8/5/2020</a:t>
+              <a:t>11/4/2020</a:t>
             </a:fld>
             <a:endParaRPr lang="en-US"/>
           </a:p>
@@ -459,7 +461,7 @@
           <a:p>
             <a:fld id="{0B1F5AC1-8606-4CD7-AA4E-C724948A05F2}" type="datetimeFigureOut">
               <a:rPr lang="en-US" smtClean="0"/>
-              <a:t>8/5/2020</a:t>
+              <a:t>11/4/2020</a:t>
             </a:fld>
             <a:endParaRPr lang="en-US"/>
           </a:p>
@@ -667,7 +669,7 @@
           <a:p>
             <a:fld id="{0B1F5AC1-8606-4CD7-AA4E-C724948A05F2}" type="datetimeFigureOut">
               <a:rPr lang="en-US" smtClean="0"/>
-              <a:t>8/5/2020</a:t>
+              <a:t>11/4/2020</a:t>
             </a:fld>
             <a:endParaRPr lang="en-US"/>
           </a:p>
@@ -865,7 +867,7 @@
           <a:p>
             <a:fld id="{0B1F5AC1-8606-4CD7-AA4E-C724948A05F2}" type="datetimeFigureOut">
               <a:rPr lang="en-US" smtClean="0"/>
-              <a:t>8/5/2020</a:t>
+              <a:t>11/4/2020</a:t>
             </a:fld>
             <a:endParaRPr lang="en-US"/>
           </a:p>
@@ -1140,7 +1142,7 @@
           <a:p>
             <a:fld id="{0B1F5AC1-8606-4CD7-AA4E-C724948A05F2}" type="datetimeFigureOut">
               <a:rPr lang="en-US" smtClean="0"/>
-              <a:t>8/5/2020</a:t>
+              <a:t>11/4/2020</a:t>
             </a:fld>
             <a:endParaRPr lang="en-US"/>
           </a:p>
@@ -1405,7 +1407,7 @@
           <a:p>
             <a:fld id="{0B1F5AC1-8606-4CD7-AA4E-C724948A05F2}" type="datetimeFigureOut">
               <a:rPr lang="en-US" smtClean="0"/>
-              <a:t>8/5/2020</a:t>
+              <a:t>11/4/2020</a:t>
             </a:fld>
             <a:endParaRPr lang="en-US"/>
           </a:p>
@@ -1817,7 +1819,7 @@
           <a:p>
             <a:fld id="{0B1F5AC1-8606-4CD7-AA4E-C724948A05F2}" type="datetimeFigureOut">
               <a:rPr lang="en-US" smtClean="0"/>
-              <a:t>8/5/2020</a:t>
+              <a:t>11/4/2020</a:t>
             </a:fld>
             <a:endParaRPr lang="en-US"/>
           </a:p>
@@ -1958,7 +1960,7 @@
           <a:p>
             <a:fld id="{0B1F5AC1-8606-4CD7-AA4E-C724948A05F2}" type="datetimeFigureOut">
               <a:rPr lang="en-US" smtClean="0"/>
-              <a:t>8/5/2020</a:t>
+              <a:t>11/4/2020</a:t>
             </a:fld>
             <a:endParaRPr lang="en-US"/>
           </a:p>
@@ -2071,7 +2073,7 @@
           <a:p>
             <a:fld id="{0B1F5AC1-8606-4CD7-AA4E-C724948A05F2}" type="datetimeFigureOut">
               <a:rPr lang="en-US" smtClean="0"/>
-              <a:t>8/5/2020</a:t>
+              <a:t>11/4/2020</a:t>
             </a:fld>
             <a:endParaRPr lang="en-US"/>
           </a:p>
@@ -2382,7 +2384,7 @@
           <a:p>
             <a:fld id="{0B1F5AC1-8606-4CD7-AA4E-C724948A05F2}" type="datetimeFigureOut">
               <a:rPr lang="en-US" smtClean="0"/>
-              <a:t>8/5/2020</a:t>
+              <a:t>11/4/2020</a:t>
             </a:fld>
             <a:endParaRPr lang="en-US"/>
           </a:p>
@@ -2670,7 +2672,7 @@
           <a:p>
             <a:fld id="{0B1F5AC1-8606-4CD7-AA4E-C724948A05F2}" type="datetimeFigureOut">
               <a:rPr lang="en-US" smtClean="0"/>
-              <a:t>8/5/2020</a:t>
+              <a:t>11/4/2020</a:t>
             </a:fld>
             <a:endParaRPr lang="en-US"/>
           </a:p>
@@ -2911,7 +2913,7 @@
           <a:p>
             <a:fld id="{0B1F5AC1-8606-4CD7-AA4E-C724948A05F2}" type="datetimeFigureOut">
               <a:rPr lang="en-US" smtClean="0"/>
-              <a:t>8/5/2020</a:t>
+              <a:t>11/4/2020</a:t>
             </a:fld>
             <a:endParaRPr lang="en-US"/>
           </a:p>
@@ -6887,6 +6889,4372 @@
 </p:sld>
 </file>
 
+<file path=ppt/slides/slide4.xml><?xml version="1.0" encoding="utf-8"?>
+<p:sld xmlns:a="http://schemas.openxmlformats.org/drawingml/2006/main" xmlns:r="http://schemas.openxmlformats.org/officeDocument/2006/relationships" xmlns:p="http://schemas.openxmlformats.org/presentationml/2006/main">
+  <p:cSld>
+    <p:spTree>
+      <p:nvGrpSpPr>
+        <p:cNvPr id="1" name=""/>
+        <p:cNvGrpSpPr/>
+        <p:nvPr/>
+      </p:nvGrpSpPr>
+      <p:grpSpPr>
+        <a:xfrm>
+          <a:off x="0" y="0"/>
+          <a:ext cx="0" cy="0"/>
+          <a:chOff x="0" y="0"/>
+          <a:chExt cx="0" cy="0"/>
+        </a:xfrm>
+      </p:grpSpPr>
+      <p:sp>
+        <p:nvSpPr>
+          <p:cNvPr id="4" name="Oval 3">
+            <a:extLst>
+              <a:ext uri="{FF2B5EF4-FFF2-40B4-BE49-F238E27FC236}">
+                <a16:creationId xmlns:a16="http://schemas.microsoft.com/office/drawing/2014/main" id="{A07C5931-D85F-4F7F-A19F-1D12B4EEECBA}"/>
+              </a:ext>
+            </a:extLst>
+          </p:cNvPr>
+          <p:cNvSpPr/>
+          <p:nvPr/>
+        </p:nvSpPr>
+        <p:spPr>
+          <a:xfrm>
+            <a:off x="950074" y="3459045"/>
+            <a:ext cx="359677" cy="341163"/>
+          </a:xfrm>
+          <a:prstGeom prst="ellipse">
+            <a:avLst/>
+          </a:prstGeom>
+          <a:noFill/>
+          <a:ln>
+            <a:solidFill>
+              <a:schemeClr val="tx1"/>
+            </a:solidFill>
+          </a:ln>
+        </p:spPr>
+        <p:style>
+          <a:lnRef idx="2">
+            <a:schemeClr val="accent1">
+              <a:shade val="50000"/>
+            </a:schemeClr>
+          </a:lnRef>
+          <a:fillRef idx="1">
+            <a:schemeClr val="accent1"/>
+          </a:fillRef>
+          <a:effectRef idx="0">
+            <a:schemeClr val="accent1"/>
+          </a:effectRef>
+          <a:fontRef idx="minor">
+            <a:schemeClr val="lt1"/>
+          </a:fontRef>
+        </p:style>
+        <p:txBody>
+          <a:bodyPr rtlCol="0" anchor="ctr"/>
+          <a:lstStyle/>
+          <a:p>
+            <a:pPr algn="ctr"/>
+            <a:endParaRPr lang="en-US"/>
+          </a:p>
+        </p:txBody>
+      </p:sp>
+      <p:sp>
+        <p:nvSpPr>
+          <p:cNvPr id="5" name="Oval 4">
+            <a:extLst>
+              <a:ext uri="{FF2B5EF4-FFF2-40B4-BE49-F238E27FC236}">
+                <a16:creationId xmlns:a16="http://schemas.microsoft.com/office/drawing/2014/main" id="{47E1C8E6-ADF6-4268-873B-4408B0BE5414}"/>
+              </a:ext>
+            </a:extLst>
+          </p:cNvPr>
+          <p:cNvSpPr/>
+          <p:nvPr/>
+        </p:nvSpPr>
+        <p:spPr>
+          <a:xfrm>
+            <a:off x="1868659" y="3292933"/>
+            <a:ext cx="682306" cy="639662"/>
+          </a:xfrm>
+          <a:prstGeom prst="ellipse">
+            <a:avLst/>
+          </a:prstGeom>
+          <a:noFill/>
+          <a:ln>
+            <a:solidFill>
+              <a:schemeClr val="tx1"/>
+            </a:solidFill>
+          </a:ln>
+        </p:spPr>
+        <p:style>
+          <a:lnRef idx="2">
+            <a:schemeClr val="accent1">
+              <a:shade val="50000"/>
+            </a:schemeClr>
+          </a:lnRef>
+          <a:fillRef idx="1">
+            <a:schemeClr val="accent1"/>
+          </a:fillRef>
+          <a:effectRef idx="0">
+            <a:schemeClr val="accent1"/>
+          </a:effectRef>
+          <a:fontRef idx="minor">
+            <a:schemeClr val="lt1"/>
+          </a:fontRef>
+        </p:style>
+        <p:txBody>
+          <a:bodyPr rtlCol="0" anchor="ctr"/>
+          <a:lstStyle/>
+          <a:p>
+            <a:pPr algn="ctr"/>
+            <a:endParaRPr lang="en-US"/>
+          </a:p>
+        </p:txBody>
+      </p:sp>
+      <p:sp>
+        <p:nvSpPr>
+          <p:cNvPr id="6" name="Oval 5">
+            <a:extLst>
+              <a:ext uri="{FF2B5EF4-FFF2-40B4-BE49-F238E27FC236}">
+                <a16:creationId xmlns:a16="http://schemas.microsoft.com/office/drawing/2014/main" id="{F0041F1A-D913-4E72-A193-8A160092E4BB}"/>
+              </a:ext>
+            </a:extLst>
+          </p:cNvPr>
+          <p:cNvSpPr/>
+          <p:nvPr/>
+        </p:nvSpPr>
+        <p:spPr>
+          <a:xfrm>
+            <a:off x="3012164" y="3301102"/>
+            <a:ext cx="682307" cy="639661"/>
+          </a:xfrm>
+          <a:prstGeom prst="ellipse">
+            <a:avLst/>
+          </a:prstGeom>
+          <a:noFill/>
+          <a:ln>
+            <a:solidFill>
+              <a:schemeClr val="tx1"/>
+            </a:solidFill>
+          </a:ln>
+        </p:spPr>
+        <p:style>
+          <a:lnRef idx="2">
+            <a:schemeClr val="accent1">
+              <a:shade val="50000"/>
+            </a:schemeClr>
+          </a:lnRef>
+          <a:fillRef idx="1">
+            <a:schemeClr val="accent1"/>
+          </a:fillRef>
+          <a:effectRef idx="0">
+            <a:schemeClr val="accent1"/>
+          </a:effectRef>
+          <a:fontRef idx="minor">
+            <a:schemeClr val="lt1"/>
+          </a:fontRef>
+        </p:style>
+        <p:txBody>
+          <a:bodyPr rtlCol="0" anchor="ctr"/>
+          <a:lstStyle/>
+          <a:p>
+            <a:pPr algn="ctr"/>
+            <a:endParaRPr lang="en-US"/>
+          </a:p>
+        </p:txBody>
+      </p:sp>
+      <p:sp>
+        <p:nvSpPr>
+          <p:cNvPr id="7" name="Oval 6">
+            <a:extLst>
+              <a:ext uri="{FF2B5EF4-FFF2-40B4-BE49-F238E27FC236}">
+                <a16:creationId xmlns:a16="http://schemas.microsoft.com/office/drawing/2014/main" id="{7F3A1102-6802-4087-BCA2-A200858F8959}"/>
+              </a:ext>
+            </a:extLst>
+          </p:cNvPr>
+          <p:cNvSpPr/>
+          <p:nvPr/>
+        </p:nvSpPr>
+        <p:spPr>
+          <a:xfrm>
+            <a:off x="4187004" y="3292933"/>
+            <a:ext cx="682306" cy="639661"/>
+          </a:xfrm>
+          <a:prstGeom prst="ellipse">
+            <a:avLst/>
+          </a:prstGeom>
+          <a:noFill/>
+          <a:ln>
+            <a:solidFill>
+              <a:schemeClr val="tx1"/>
+            </a:solidFill>
+          </a:ln>
+        </p:spPr>
+        <p:style>
+          <a:lnRef idx="2">
+            <a:schemeClr val="accent1">
+              <a:shade val="50000"/>
+            </a:schemeClr>
+          </a:lnRef>
+          <a:fillRef idx="1">
+            <a:schemeClr val="accent1"/>
+          </a:fillRef>
+          <a:effectRef idx="0">
+            <a:schemeClr val="accent1"/>
+          </a:effectRef>
+          <a:fontRef idx="minor">
+            <a:schemeClr val="lt1"/>
+          </a:fontRef>
+        </p:style>
+        <p:txBody>
+          <a:bodyPr rtlCol="0" anchor="ctr"/>
+          <a:lstStyle/>
+          <a:p>
+            <a:pPr algn="ctr"/>
+            <a:endParaRPr lang="en-US"/>
+          </a:p>
+        </p:txBody>
+      </p:sp>
+      <p:sp>
+        <p:nvSpPr>
+          <p:cNvPr id="8" name="Oval 7">
+            <a:extLst>
+              <a:ext uri="{FF2B5EF4-FFF2-40B4-BE49-F238E27FC236}">
+                <a16:creationId xmlns:a16="http://schemas.microsoft.com/office/drawing/2014/main" id="{6EC78ABC-1B37-4148-A6D5-7B2A947F4981}"/>
+              </a:ext>
+            </a:extLst>
+          </p:cNvPr>
+          <p:cNvSpPr/>
+          <p:nvPr/>
+        </p:nvSpPr>
+        <p:spPr>
+          <a:xfrm>
+            <a:off x="5623504" y="2422429"/>
+            <a:ext cx="2125211" cy="1990987"/>
+          </a:xfrm>
+          <a:prstGeom prst="ellipse">
+            <a:avLst/>
+          </a:prstGeom>
+          <a:noFill/>
+          <a:ln>
+            <a:solidFill>
+              <a:schemeClr val="tx1"/>
+            </a:solidFill>
+          </a:ln>
+        </p:spPr>
+        <p:style>
+          <a:lnRef idx="2">
+            <a:schemeClr val="accent1">
+              <a:shade val="50000"/>
+            </a:schemeClr>
+          </a:lnRef>
+          <a:fillRef idx="1">
+            <a:schemeClr val="accent1"/>
+          </a:fillRef>
+          <a:effectRef idx="0">
+            <a:schemeClr val="accent1"/>
+          </a:effectRef>
+          <a:fontRef idx="minor">
+            <a:schemeClr val="lt1"/>
+          </a:fontRef>
+        </p:style>
+        <p:txBody>
+          <a:bodyPr rtlCol="0" anchor="ctr"/>
+          <a:lstStyle/>
+          <a:p>
+            <a:pPr algn="ctr"/>
+            <a:endParaRPr lang="en-US"/>
+          </a:p>
+        </p:txBody>
+      </p:sp>
+      <p:sp>
+        <p:nvSpPr>
+          <p:cNvPr id="9" name="TextBox 8">
+            <a:extLst>
+              <a:ext uri="{FF2B5EF4-FFF2-40B4-BE49-F238E27FC236}">
+                <a16:creationId xmlns:a16="http://schemas.microsoft.com/office/drawing/2014/main" id="{0372BDC4-7C45-4B64-A8C6-5B75A3AA66E8}"/>
+              </a:ext>
+            </a:extLst>
+          </p:cNvPr>
+          <p:cNvSpPr txBox="1"/>
+          <p:nvPr/>
+        </p:nvSpPr>
+        <p:spPr>
+          <a:xfrm>
+            <a:off x="8391605" y="3244896"/>
+            <a:ext cx="1359016" cy="400110"/>
+          </a:xfrm>
+          <a:prstGeom prst="rect">
+            <a:avLst/>
+          </a:prstGeom>
+          <a:noFill/>
+        </p:spPr>
+        <p:txBody>
+          <a:bodyPr wrap="square" rtlCol="0">
+            <a:spAutoFit/>
+          </a:bodyPr>
+          <a:lstStyle/>
+          <a:p>
+            <a:r>
+              <a:rPr lang="en-US" sz="2000" b="1" dirty="0">
+                <a:cs typeface="Times New Roman" panose="02020603050405020304" pitchFamily="18" charset="0"/>
+              </a:rPr>
+              <a:t>Scenario 1</a:t>
+            </a:r>
+          </a:p>
+        </p:txBody>
+      </p:sp>
+      <p:cxnSp>
+        <p:nvCxnSpPr>
+          <p:cNvPr id="10" name="Straight Arrow Connector 9">
+            <a:extLst>
+              <a:ext uri="{FF2B5EF4-FFF2-40B4-BE49-F238E27FC236}">
+                <a16:creationId xmlns:a16="http://schemas.microsoft.com/office/drawing/2014/main" id="{A99CB188-BEA4-48E6-BFCD-546A95FEBB99}"/>
+              </a:ext>
+            </a:extLst>
+          </p:cNvPr>
+          <p:cNvCxnSpPr>
+            <a:cxnSpLocks/>
+          </p:cNvCxnSpPr>
+          <p:nvPr/>
+        </p:nvCxnSpPr>
+        <p:spPr>
+          <a:xfrm flipV="1">
+            <a:off x="1129985" y="2953525"/>
+            <a:ext cx="0" cy="536066"/>
+          </a:xfrm>
+          <a:prstGeom prst="straightConnector1">
+            <a:avLst/>
+          </a:prstGeom>
+          <a:ln>
+            <a:tailEnd type="triangle"/>
+          </a:ln>
+        </p:spPr>
+        <p:style>
+          <a:lnRef idx="2">
+            <a:schemeClr val="dk1"/>
+          </a:lnRef>
+          <a:fillRef idx="0">
+            <a:schemeClr val="dk1"/>
+          </a:fillRef>
+          <a:effectRef idx="1">
+            <a:schemeClr val="dk1"/>
+          </a:effectRef>
+          <a:fontRef idx="minor">
+            <a:schemeClr val="tx1"/>
+          </a:fontRef>
+        </p:style>
+      </p:cxnSp>
+      <p:cxnSp>
+        <p:nvCxnSpPr>
+          <p:cNvPr id="11" name="Straight Arrow Connector 10">
+            <a:extLst>
+              <a:ext uri="{FF2B5EF4-FFF2-40B4-BE49-F238E27FC236}">
+                <a16:creationId xmlns:a16="http://schemas.microsoft.com/office/drawing/2014/main" id="{13897D49-8D3E-4C78-BBBF-196646873E0F}"/>
+              </a:ext>
+            </a:extLst>
+          </p:cNvPr>
+          <p:cNvCxnSpPr>
+            <a:cxnSpLocks/>
+          </p:cNvCxnSpPr>
+          <p:nvPr/>
+        </p:nvCxnSpPr>
+        <p:spPr>
+          <a:xfrm flipV="1">
+            <a:off x="2209812" y="2714070"/>
+            <a:ext cx="0" cy="703852"/>
+          </a:xfrm>
+          <a:prstGeom prst="straightConnector1">
+            <a:avLst/>
+          </a:prstGeom>
+          <a:ln>
+            <a:tailEnd type="triangle"/>
+          </a:ln>
+        </p:spPr>
+        <p:style>
+          <a:lnRef idx="2">
+            <a:schemeClr val="dk1"/>
+          </a:lnRef>
+          <a:fillRef idx="0">
+            <a:schemeClr val="dk1"/>
+          </a:fillRef>
+          <a:effectRef idx="1">
+            <a:schemeClr val="dk1"/>
+          </a:effectRef>
+          <a:fontRef idx="minor">
+            <a:schemeClr val="tx1"/>
+          </a:fontRef>
+        </p:style>
+      </p:cxnSp>
+      <p:cxnSp>
+        <p:nvCxnSpPr>
+          <p:cNvPr id="12" name="Straight Arrow Connector 11">
+            <a:extLst>
+              <a:ext uri="{FF2B5EF4-FFF2-40B4-BE49-F238E27FC236}">
+                <a16:creationId xmlns:a16="http://schemas.microsoft.com/office/drawing/2014/main" id="{C0D59B97-7FD1-455D-8412-BF92C06F900D}"/>
+              </a:ext>
+            </a:extLst>
+          </p:cNvPr>
+          <p:cNvCxnSpPr>
+            <a:cxnSpLocks/>
+          </p:cNvCxnSpPr>
+          <p:nvPr/>
+        </p:nvCxnSpPr>
+        <p:spPr>
+          <a:xfrm flipV="1">
+            <a:off x="3350522" y="2714070"/>
+            <a:ext cx="0" cy="697027"/>
+          </a:xfrm>
+          <a:prstGeom prst="straightConnector1">
+            <a:avLst/>
+          </a:prstGeom>
+          <a:ln>
+            <a:tailEnd type="triangle"/>
+          </a:ln>
+        </p:spPr>
+        <p:style>
+          <a:lnRef idx="2">
+            <a:schemeClr val="dk1"/>
+          </a:lnRef>
+          <a:fillRef idx="0">
+            <a:schemeClr val="dk1"/>
+          </a:fillRef>
+          <a:effectRef idx="1">
+            <a:schemeClr val="dk1"/>
+          </a:effectRef>
+          <a:fontRef idx="minor">
+            <a:schemeClr val="tx1"/>
+          </a:fontRef>
+        </p:style>
+      </p:cxnSp>
+      <p:cxnSp>
+        <p:nvCxnSpPr>
+          <p:cNvPr id="13" name="Straight Arrow Connector 12">
+            <a:extLst>
+              <a:ext uri="{FF2B5EF4-FFF2-40B4-BE49-F238E27FC236}">
+                <a16:creationId xmlns:a16="http://schemas.microsoft.com/office/drawing/2014/main" id="{E3660ED8-2786-42C1-9F0E-CD6C3756136C}"/>
+              </a:ext>
+            </a:extLst>
+          </p:cNvPr>
+          <p:cNvCxnSpPr>
+            <a:cxnSpLocks/>
+          </p:cNvCxnSpPr>
+          <p:nvPr/>
+        </p:nvCxnSpPr>
+        <p:spPr>
+          <a:xfrm flipV="1">
+            <a:off x="4530281" y="2714070"/>
+            <a:ext cx="0" cy="659212"/>
+          </a:xfrm>
+          <a:prstGeom prst="straightConnector1">
+            <a:avLst/>
+          </a:prstGeom>
+          <a:ln>
+            <a:tailEnd type="triangle"/>
+          </a:ln>
+        </p:spPr>
+        <p:style>
+          <a:lnRef idx="2">
+            <a:schemeClr val="dk1"/>
+          </a:lnRef>
+          <a:fillRef idx="0">
+            <a:schemeClr val="dk1"/>
+          </a:fillRef>
+          <a:effectRef idx="1">
+            <a:schemeClr val="dk1"/>
+          </a:effectRef>
+          <a:fontRef idx="minor">
+            <a:schemeClr val="tx1"/>
+          </a:fontRef>
+        </p:style>
+      </p:cxnSp>
+      <p:cxnSp>
+        <p:nvCxnSpPr>
+          <p:cNvPr id="14" name="Straight Arrow Connector 13">
+            <a:extLst>
+              <a:ext uri="{FF2B5EF4-FFF2-40B4-BE49-F238E27FC236}">
+                <a16:creationId xmlns:a16="http://schemas.microsoft.com/office/drawing/2014/main" id="{317F1299-5B0D-4307-BCE2-ED5F5FA774BE}"/>
+              </a:ext>
+            </a:extLst>
+          </p:cNvPr>
+          <p:cNvCxnSpPr>
+            <a:cxnSpLocks/>
+          </p:cNvCxnSpPr>
+          <p:nvPr/>
+        </p:nvCxnSpPr>
+        <p:spPr>
+          <a:xfrm flipV="1">
+            <a:off x="6675485" y="2105836"/>
+            <a:ext cx="1" cy="894518"/>
+          </a:xfrm>
+          <a:prstGeom prst="straightConnector1">
+            <a:avLst/>
+          </a:prstGeom>
+          <a:ln>
+            <a:tailEnd type="triangle"/>
+          </a:ln>
+        </p:spPr>
+        <p:style>
+          <a:lnRef idx="2">
+            <a:schemeClr val="dk1"/>
+          </a:lnRef>
+          <a:fillRef idx="0">
+            <a:schemeClr val="dk1"/>
+          </a:fillRef>
+          <a:effectRef idx="1">
+            <a:schemeClr val="dk1"/>
+          </a:effectRef>
+          <a:fontRef idx="minor">
+            <a:schemeClr val="tx1"/>
+          </a:fontRef>
+        </p:style>
+      </p:cxnSp>
+      <p:cxnSp>
+        <p:nvCxnSpPr>
+          <p:cNvPr id="15" name="Straight Arrow Connector 14">
+            <a:extLst>
+              <a:ext uri="{FF2B5EF4-FFF2-40B4-BE49-F238E27FC236}">
+                <a16:creationId xmlns:a16="http://schemas.microsoft.com/office/drawing/2014/main" id="{57700B38-3745-464E-9046-ED06308EBC0B}"/>
+              </a:ext>
+            </a:extLst>
+          </p:cNvPr>
+          <p:cNvCxnSpPr>
+            <a:cxnSpLocks/>
+          </p:cNvCxnSpPr>
+          <p:nvPr/>
+        </p:nvCxnSpPr>
+        <p:spPr>
+          <a:xfrm>
+            <a:off x="1128974" y="3724934"/>
+            <a:ext cx="0" cy="620564"/>
+          </a:xfrm>
+          <a:prstGeom prst="straightConnector1">
+            <a:avLst/>
+          </a:prstGeom>
+          <a:ln>
+            <a:tailEnd type="triangle"/>
+          </a:ln>
+        </p:spPr>
+        <p:style>
+          <a:lnRef idx="2">
+            <a:schemeClr val="accent3"/>
+          </a:lnRef>
+          <a:fillRef idx="0">
+            <a:schemeClr val="accent3"/>
+          </a:fillRef>
+          <a:effectRef idx="1">
+            <a:schemeClr val="accent3"/>
+          </a:effectRef>
+          <a:fontRef idx="minor">
+            <a:schemeClr val="tx1"/>
+          </a:fontRef>
+        </p:style>
+      </p:cxnSp>
+      <p:cxnSp>
+        <p:nvCxnSpPr>
+          <p:cNvPr id="16" name="Straight Arrow Connector 15">
+            <a:extLst>
+              <a:ext uri="{FF2B5EF4-FFF2-40B4-BE49-F238E27FC236}">
+                <a16:creationId xmlns:a16="http://schemas.microsoft.com/office/drawing/2014/main" id="{802D4EAB-AA30-4149-B84E-4C2E4330CB36}"/>
+              </a:ext>
+            </a:extLst>
+          </p:cNvPr>
+          <p:cNvCxnSpPr>
+            <a:cxnSpLocks/>
+          </p:cNvCxnSpPr>
+          <p:nvPr/>
+        </p:nvCxnSpPr>
+        <p:spPr>
+          <a:xfrm flipH="1">
+            <a:off x="2209812" y="3831098"/>
+            <a:ext cx="1146" cy="705133"/>
+          </a:xfrm>
+          <a:prstGeom prst="straightConnector1">
+            <a:avLst/>
+          </a:prstGeom>
+          <a:ln>
+            <a:tailEnd type="triangle"/>
+          </a:ln>
+        </p:spPr>
+        <p:style>
+          <a:lnRef idx="2">
+            <a:schemeClr val="accent3"/>
+          </a:lnRef>
+          <a:fillRef idx="0">
+            <a:schemeClr val="accent3"/>
+          </a:fillRef>
+          <a:effectRef idx="1">
+            <a:schemeClr val="accent3"/>
+          </a:effectRef>
+          <a:fontRef idx="minor">
+            <a:schemeClr val="tx1"/>
+          </a:fontRef>
+        </p:style>
+      </p:cxnSp>
+      <p:cxnSp>
+        <p:nvCxnSpPr>
+          <p:cNvPr id="17" name="Straight Arrow Connector 16">
+            <a:extLst>
+              <a:ext uri="{FF2B5EF4-FFF2-40B4-BE49-F238E27FC236}">
+                <a16:creationId xmlns:a16="http://schemas.microsoft.com/office/drawing/2014/main" id="{722A78FE-E56A-4266-A478-C02B8A254549}"/>
+              </a:ext>
+            </a:extLst>
+          </p:cNvPr>
+          <p:cNvCxnSpPr>
+            <a:cxnSpLocks/>
+          </p:cNvCxnSpPr>
+          <p:nvPr/>
+        </p:nvCxnSpPr>
+        <p:spPr>
+          <a:xfrm>
+            <a:off x="3345448" y="3835534"/>
+            <a:ext cx="12857" cy="700697"/>
+          </a:xfrm>
+          <a:prstGeom prst="straightConnector1">
+            <a:avLst/>
+          </a:prstGeom>
+          <a:ln>
+            <a:tailEnd type="triangle"/>
+          </a:ln>
+        </p:spPr>
+        <p:style>
+          <a:lnRef idx="2">
+            <a:schemeClr val="accent3"/>
+          </a:lnRef>
+          <a:fillRef idx="0">
+            <a:schemeClr val="accent3"/>
+          </a:fillRef>
+          <a:effectRef idx="1">
+            <a:schemeClr val="accent3"/>
+          </a:effectRef>
+          <a:fontRef idx="minor">
+            <a:schemeClr val="tx1"/>
+          </a:fontRef>
+        </p:style>
+      </p:cxnSp>
+      <p:cxnSp>
+        <p:nvCxnSpPr>
+          <p:cNvPr id="18" name="Straight Arrow Connector 17">
+            <a:extLst>
+              <a:ext uri="{FF2B5EF4-FFF2-40B4-BE49-F238E27FC236}">
+                <a16:creationId xmlns:a16="http://schemas.microsoft.com/office/drawing/2014/main" id="{BDF64E9A-DC18-4FA8-AA16-5EC38B5780E1}"/>
+              </a:ext>
+            </a:extLst>
+          </p:cNvPr>
+          <p:cNvCxnSpPr>
+            <a:cxnSpLocks/>
+          </p:cNvCxnSpPr>
+          <p:nvPr/>
+        </p:nvCxnSpPr>
+        <p:spPr>
+          <a:xfrm>
+            <a:off x="4520304" y="3828642"/>
+            <a:ext cx="15703" cy="699760"/>
+          </a:xfrm>
+          <a:prstGeom prst="straightConnector1">
+            <a:avLst/>
+          </a:prstGeom>
+          <a:ln>
+            <a:tailEnd type="triangle"/>
+          </a:ln>
+        </p:spPr>
+        <p:style>
+          <a:lnRef idx="2">
+            <a:schemeClr val="accent3"/>
+          </a:lnRef>
+          <a:fillRef idx="0">
+            <a:schemeClr val="accent3"/>
+          </a:fillRef>
+          <a:effectRef idx="1">
+            <a:schemeClr val="accent3"/>
+          </a:effectRef>
+          <a:fontRef idx="minor">
+            <a:schemeClr val="tx1"/>
+          </a:fontRef>
+        </p:style>
+      </p:cxnSp>
+      <p:cxnSp>
+        <p:nvCxnSpPr>
+          <p:cNvPr id="19" name="Straight Arrow Connector 18">
+            <a:extLst>
+              <a:ext uri="{FF2B5EF4-FFF2-40B4-BE49-F238E27FC236}">
+                <a16:creationId xmlns:a16="http://schemas.microsoft.com/office/drawing/2014/main" id="{4EF6718C-A025-4868-8463-EA3CDED88F41}"/>
+              </a:ext>
+            </a:extLst>
+          </p:cNvPr>
+          <p:cNvCxnSpPr>
+            <a:cxnSpLocks/>
+          </p:cNvCxnSpPr>
+          <p:nvPr/>
+        </p:nvCxnSpPr>
+        <p:spPr>
+          <a:xfrm>
+            <a:off x="6686107" y="4016056"/>
+            <a:ext cx="0" cy="794719"/>
+          </a:xfrm>
+          <a:prstGeom prst="straightConnector1">
+            <a:avLst/>
+          </a:prstGeom>
+          <a:ln>
+            <a:tailEnd type="triangle"/>
+          </a:ln>
+        </p:spPr>
+        <p:style>
+          <a:lnRef idx="2">
+            <a:schemeClr val="accent3"/>
+          </a:lnRef>
+          <a:fillRef idx="0">
+            <a:schemeClr val="accent3"/>
+          </a:fillRef>
+          <a:effectRef idx="1">
+            <a:schemeClr val="accent3"/>
+          </a:effectRef>
+          <a:fontRef idx="minor">
+            <a:schemeClr val="tx1"/>
+          </a:fontRef>
+        </p:style>
+      </p:cxnSp>
+      <p:sp>
+        <p:nvSpPr>
+          <p:cNvPr id="20" name="TextBox 19">
+            <a:extLst>
+              <a:ext uri="{FF2B5EF4-FFF2-40B4-BE49-F238E27FC236}">
+                <a16:creationId xmlns:a16="http://schemas.microsoft.com/office/drawing/2014/main" id="{882ABA87-FB04-42F6-89B7-5AE075528202}"/>
+              </a:ext>
+            </a:extLst>
+          </p:cNvPr>
+          <p:cNvSpPr txBox="1"/>
+          <p:nvPr/>
+        </p:nvSpPr>
+        <p:spPr>
+          <a:xfrm>
+            <a:off x="897550" y="5212293"/>
+            <a:ext cx="1788252" cy="461665"/>
+          </a:xfrm>
+          <a:prstGeom prst="rect">
+            <a:avLst/>
+          </a:prstGeom>
+          <a:noFill/>
+        </p:spPr>
+        <p:txBody>
+          <a:bodyPr wrap="square" rtlCol="0">
+            <a:spAutoFit/>
+          </a:bodyPr>
+          <a:lstStyle/>
+          <a:p>
+            <a:r>
+              <a:rPr lang="en-US" sz="2400" b="1" dirty="0">
+                <a:cs typeface="Times New Roman" panose="02020603050405020304" pitchFamily="18" charset="0"/>
+              </a:rPr>
+              <a:t>Proportional</a:t>
+            </a:r>
+          </a:p>
+        </p:txBody>
+      </p:sp>
+      <p:sp>
+        <p:nvSpPr>
+          <p:cNvPr id="21" name="TextBox 20">
+            <a:extLst>
+              <a:ext uri="{FF2B5EF4-FFF2-40B4-BE49-F238E27FC236}">
+                <a16:creationId xmlns:a16="http://schemas.microsoft.com/office/drawing/2014/main" id="{A64AC910-7225-41F9-88F2-4D2834566B7E}"/>
+              </a:ext>
+            </a:extLst>
+          </p:cNvPr>
+          <p:cNvSpPr txBox="1"/>
+          <p:nvPr/>
+        </p:nvSpPr>
+        <p:spPr>
+          <a:xfrm>
+            <a:off x="897550" y="1552362"/>
+            <a:ext cx="1788252" cy="461665"/>
+          </a:xfrm>
+          <a:prstGeom prst="rect">
+            <a:avLst/>
+          </a:prstGeom>
+          <a:noFill/>
+        </p:spPr>
+        <p:txBody>
+          <a:bodyPr wrap="square" rtlCol="0">
+            <a:spAutoFit/>
+          </a:bodyPr>
+          <a:lstStyle/>
+          <a:p>
+            <a:r>
+              <a:rPr lang="en-US" sz="2400" b="1" dirty="0">
+                <a:cs typeface="Times New Roman" panose="02020603050405020304" pitchFamily="18" charset="0"/>
+              </a:rPr>
+              <a:t>Equal</a:t>
+            </a:r>
+          </a:p>
+        </p:txBody>
+      </p:sp>
+      <p:sp>
+        <p:nvSpPr>
+          <p:cNvPr id="22" name="TextBox 21">
+            <a:extLst>
+              <a:ext uri="{FF2B5EF4-FFF2-40B4-BE49-F238E27FC236}">
+                <a16:creationId xmlns:a16="http://schemas.microsoft.com/office/drawing/2014/main" id="{DFDB836C-CE20-4701-9C7E-5E2083A2F3F7}"/>
+              </a:ext>
+            </a:extLst>
+          </p:cNvPr>
+          <p:cNvSpPr txBox="1"/>
+          <p:nvPr/>
+        </p:nvSpPr>
+        <p:spPr>
+          <a:xfrm>
+            <a:off x="897550" y="3429000"/>
+            <a:ext cx="464723" cy="400110"/>
+          </a:xfrm>
+          <a:prstGeom prst="rect">
+            <a:avLst/>
+          </a:prstGeom>
+          <a:noFill/>
+        </p:spPr>
+        <p:txBody>
+          <a:bodyPr wrap="square" rtlCol="0">
+            <a:spAutoFit/>
+          </a:bodyPr>
+          <a:lstStyle/>
+          <a:p>
+            <a:r>
+              <a:rPr lang="en-US" sz="2000" dirty="0">
+                <a:cs typeface="Times New Roman" panose="02020603050405020304" pitchFamily="18" charset="0"/>
+              </a:rPr>
+              <a:t>30</a:t>
+            </a:r>
+            <a:endParaRPr lang="en-US" sz="1400" dirty="0">
+              <a:cs typeface="Times New Roman" panose="02020603050405020304" pitchFamily="18" charset="0"/>
+            </a:endParaRPr>
+          </a:p>
+        </p:txBody>
+      </p:sp>
+      <p:sp>
+        <p:nvSpPr>
+          <p:cNvPr id="23" name="TextBox 22">
+            <a:extLst>
+              <a:ext uri="{FF2B5EF4-FFF2-40B4-BE49-F238E27FC236}">
+                <a16:creationId xmlns:a16="http://schemas.microsoft.com/office/drawing/2014/main" id="{2E2C3B80-C515-405D-B2A4-8D47A335C4FA}"/>
+              </a:ext>
+            </a:extLst>
+          </p:cNvPr>
+          <p:cNvSpPr txBox="1"/>
+          <p:nvPr/>
+        </p:nvSpPr>
+        <p:spPr>
+          <a:xfrm>
+            <a:off x="1916449" y="3400098"/>
+            <a:ext cx="776859" cy="400110"/>
+          </a:xfrm>
+          <a:prstGeom prst="rect">
+            <a:avLst/>
+          </a:prstGeom>
+          <a:noFill/>
+        </p:spPr>
+        <p:txBody>
+          <a:bodyPr wrap="square" rtlCol="0">
+            <a:spAutoFit/>
+          </a:bodyPr>
+          <a:lstStyle/>
+          <a:p>
+            <a:r>
+              <a:rPr lang="en-US" sz="2000" dirty="0">
+                <a:cs typeface="Times New Roman" panose="02020603050405020304" pitchFamily="18" charset="0"/>
+              </a:rPr>
+              <a:t>100</a:t>
+            </a:r>
+          </a:p>
+        </p:txBody>
+      </p:sp>
+      <p:sp>
+        <p:nvSpPr>
+          <p:cNvPr id="24" name="TextBox 23">
+            <a:extLst>
+              <a:ext uri="{FF2B5EF4-FFF2-40B4-BE49-F238E27FC236}">
+                <a16:creationId xmlns:a16="http://schemas.microsoft.com/office/drawing/2014/main" id="{B708AC4E-16BB-44E6-B2D8-160AFEC83696}"/>
+              </a:ext>
+            </a:extLst>
+          </p:cNvPr>
+          <p:cNvSpPr txBox="1"/>
+          <p:nvPr/>
+        </p:nvSpPr>
+        <p:spPr>
+          <a:xfrm>
+            <a:off x="3049636" y="3417923"/>
+            <a:ext cx="626336" cy="400110"/>
+          </a:xfrm>
+          <a:prstGeom prst="rect">
+            <a:avLst/>
+          </a:prstGeom>
+          <a:noFill/>
+        </p:spPr>
+        <p:txBody>
+          <a:bodyPr wrap="square" rtlCol="0">
+            <a:spAutoFit/>
+          </a:bodyPr>
+          <a:lstStyle/>
+          <a:p>
+            <a:r>
+              <a:rPr lang="en-US" sz="2000" dirty="0">
+                <a:cs typeface="Times New Roman" panose="02020603050405020304" pitchFamily="18" charset="0"/>
+              </a:rPr>
+              <a:t>100</a:t>
+            </a:r>
+            <a:endParaRPr lang="en-US" dirty="0">
+              <a:cs typeface="Times New Roman" panose="02020603050405020304" pitchFamily="18" charset="0"/>
+            </a:endParaRPr>
+          </a:p>
+        </p:txBody>
+      </p:sp>
+      <p:sp>
+        <p:nvSpPr>
+          <p:cNvPr id="25" name="TextBox 24">
+            <a:extLst>
+              <a:ext uri="{FF2B5EF4-FFF2-40B4-BE49-F238E27FC236}">
+                <a16:creationId xmlns:a16="http://schemas.microsoft.com/office/drawing/2014/main" id="{035C6FEE-130A-4CC8-B0A1-08A5728E3F59}"/>
+              </a:ext>
+            </a:extLst>
+          </p:cNvPr>
+          <p:cNvSpPr txBox="1"/>
+          <p:nvPr/>
+        </p:nvSpPr>
+        <p:spPr>
+          <a:xfrm>
+            <a:off x="4225381" y="3400907"/>
+            <a:ext cx="682306" cy="400110"/>
+          </a:xfrm>
+          <a:prstGeom prst="rect">
+            <a:avLst/>
+          </a:prstGeom>
+          <a:noFill/>
+        </p:spPr>
+        <p:txBody>
+          <a:bodyPr wrap="square" rtlCol="0">
+            <a:spAutoFit/>
+          </a:bodyPr>
+          <a:lstStyle/>
+          <a:p>
+            <a:r>
+              <a:rPr lang="en-US" sz="2000" dirty="0">
+                <a:cs typeface="Times New Roman" panose="02020603050405020304" pitchFamily="18" charset="0"/>
+              </a:rPr>
+              <a:t>100</a:t>
+            </a:r>
+            <a:endParaRPr lang="en-US" sz="1400" dirty="0">
+              <a:cs typeface="Times New Roman" panose="02020603050405020304" pitchFamily="18" charset="0"/>
+            </a:endParaRPr>
+          </a:p>
+        </p:txBody>
+      </p:sp>
+      <p:sp>
+        <p:nvSpPr>
+          <p:cNvPr id="26" name="TextBox 25">
+            <a:extLst>
+              <a:ext uri="{FF2B5EF4-FFF2-40B4-BE49-F238E27FC236}">
+                <a16:creationId xmlns:a16="http://schemas.microsoft.com/office/drawing/2014/main" id="{EF2C310A-A022-4A31-884B-DB82989614EF}"/>
+              </a:ext>
+            </a:extLst>
+          </p:cNvPr>
+          <p:cNvSpPr txBox="1"/>
+          <p:nvPr/>
+        </p:nvSpPr>
+        <p:spPr>
+          <a:xfrm>
+            <a:off x="6266394" y="3305213"/>
+            <a:ext cx="839429" cy="400110"/>
+          </a:xfrm>
+          <a:prstGeom prst="rect">
+            <a:avLst/>
+          </a:prstGeom>
+          <a:noFill/>
+        </p:spPr>
+        <p:txBody>
+          <a:bodyPr wrap="square" rtlCol="0">
+            <a:spAutoFit/>
+          </a:bodyPr>
+          <a:lstStyle/>
+          <a:p>
+            <a:r>
+              <a:rPr lang="en-US" sz="2000" dirty="0">
+                <a:cs typeface="Times New Roman" panose="02020603050405020304" pitchFamily="18" charset="0"/>
+              </a:rPr>
+              <a:t>1170</a:t>
+            </a:r>
+            <a:endParaRPr lang="en-US" dirty="0">
+              <a:cs typeface="Times New Roman" panose="02020603050405020304" pitchFamily="18" charset="0"/>
+            </a:endParaRPr>
+          </a:p>
+        </p:txBody>
+      </p:sp>
+      <p:sp>
+        <p:nvSpPr>
+          <p:cNvPr id="27" name="TextBox 26">
+            <a:extLst>
+              <a:ext uri="{FF2B5EF4-FFF2-40B4-BE49-F238E27FC236}">
+                <a16:creationId xmlns:a16="http://schemas.microsoft.com/office/drawing/2014/main" id="{8BEC084F-6281-4ABF-9FB5-7F051111140E}"/>
+              </a:ext>
+            </a:extLst>
+          </p:cNvPr>
+          <p:cNvSpPr txBox="1"/>
+          <p:nvPr/>
+        </p:nvSpPr>
+        <p:spPr>
+          <a:xfrm>
+            <a:off x="4312647" y="4475503"/>
+            <a:ext cx="464723" cy="400110"/>
+          </a:xfrm>
+          <a:prstGeom prst="rect">
+            <a:avLst/>
+          </a:prstGeom>
+          <a:noFill/>
+        </p:spPr>
+        <p:txBody>
+          <a:bodyPr wrap="square" rtlCol="0">
+            <a:spAutoFit/>
+          </a:bodyPr>
+          <a:lstStyle/>
+          <a:p>
+            <a:r>
+              <a:rPr lang="en-US" sz="2000" dirty="0">
+                <a:cs typeface="Times New Roman" panose="02020603050405020304" pitchFamily="18" charset="0"/>
+              </a:rPr>
+              <a:t>10</a:t>
+            </a:r>
+            <a:endParaRPr lang="en-US" dirty="0">
+              <a:cs typeface="Times New Roman" panose="02020603050405020304" pitchFamily="18" charset="0"/>
+            </a:endParaRPr>
+          </a:p>
+        </p:txBody>
+      </p:sp>
+      <p:sp>
+        <p:nvSpPr>
+          <p:cNvPr id="28" name="TextBox 27">
+            <a:extLst>
+              <a:ext uri="{FF2B5EF4-FFF2-40B4-BE49-F238E27FC236}">
+                <a16:creationId xmlns:a16="http://schemas.microsoft.com/office/drawing/2014/main" id="{18E4FA3B-E51E-4F34-95E1-EACD85F25460}"/>
+              </a:ext>
+            </a:extLst>
+          </p:cNvPr>
+          <p:cNvSpPr txBox="1"/>
+          <p:nvPr/>
+        </p:nvSpPr>
+        <p:spPr>
+          <a:xfrm>
+            <a:off x="6395023" y="4810775"/>
+            <a:ext cx="873556" cy="400110"/>
+          </a:xfrm>
+          <a:prstGeom prst="rect">
+            <a:avLst/>
+          </a:prstGeom>
+          <a:noFill/>
+        </p:spPr>
+        <p:txBody>
+          <a:bodyPr wrap="square" rtlCol="0">
+            <a:spAutoFit/>
+          </a:bodyPr>
+          <a:lstStyle/>
+          <a:p>
+            <a:r>
+              <a:rPr lang="en-US" sz="2000" dirty="0">
+                <a:cs typeface="Times New Roman" panose="02020603050405020304" pitchFamily="18" charset="0"/>
+              </a:rPr>
+              <a:t>117</a:t>
+            </a:r>
+            <a:endParaRPr lang="en-US" sz="1600" dirty="0">
+              <a:cs typeface="Times New Roman" panose="02020603050405020304" pitchFamily="18" charset="0"/>
+            </a:endParaRPr>
+          </a:p>
+        </p:txBody>
+      </p:sp>
+      <p:sp>
+        <p:nvSpPr>
+          <p:cNvPr id="29" name="TextBox 28">
+            <a:extLst>
+              <a:ext uri="{FF2B5EF4-FFF2-40B4-BE49-F238E27FC236}">
+                <a16:creationId xmlns:a16="http://schemas.microsoft.com/office/drawing/2014/main" id="{5A38F250-9ABF-4E0C-A123-511A3354BC8D}"/>
+              </a:ext>
+            </a:extLst>
+          </p:cNvPr>
+          <p:cNvSpPr txBox="1"/>
+          <p:nvPr/>
+        </p:nvSpPr>
+        <p:spPr>
+          <a:xfrm>
+            <a:off x="3138392" y="4475503"/>
+            <a:ext cx="464723" cy="400110"/>
+          </a:xfrm>
+          <a:prstGeom prst="rect">
+            <a:avLst/>
+          </a:prstGeom>
+          <a:noFill/>
+        </p:spPr>
+        <p:txBody>
+          <a:bodyPr wrap="square" rtlCol="0">
+            <a:spAutoFit/>
+          </a:bodyPr>
+          <a:lstStyle/>
+          <a:p>
+            <a:r>
+              <a:rPr lang="en-US" sz="2000" dirty="0">
+                <a:cs typeface="Times New Roman" panose="02020603050405020304" pitchFamily="18" charset="0"/>
+              </a:rPr>
+              <a:t>10</a:t>
+            </a:r>
+            <a:endParaRPr lang="en-US" dirty="0">
+              <a:cs typeface="Times New Roman" panose="02020603050405020304" pitchFamily="18" charset="0"/>
+            </a:endParaRPr>
+          </a:p>
+        </p:txBody>
+      </p:sp>
+      <p:sp>
+        <p:nvSpPr>
+          <p:cNvPr id="30" name="TextBox 29">
+            <a:extLst>
+              <a:ext uri="{FF2B5EF4-FFF2-40B4-BE49-F238E27FC236}">
+                <a16:creationId xmlns:a16="http://schemas.microsoft.com/office/drawing/2014/main" id="{8460ECED-E97E-4551-B1D5-8D458F5782DD}"/>
+              </a:ext>
+            </a:extLst>
+          </p:cNvPr>
+          <p:cNvSpPr txBox="1"/>
+          <p:nvPr/>
+        </p:nvSpPr>
+        <p:spPr>
+          <a:xfrm>
+            <a:off x="2020246" y="4475503"/>
+            <a:ext cx="464723" cy="400110"/>
+          </a:xfrm>
+          <a:prstGeom prst="rect">
+            <a:avLst/>
+          </a:prstGeom>
+          <a:noFill/>
+        </p:spPr>
+        <p:txBody>
+          <a:bodyPr wrap="square" rtlCol="0">
+            <a:spAutoFit/>
+          </a:bodyPr>
+          <a:lstStyle/>
+          <a:p>
+            <a:r>
+              <a:rPr lang="en-US" sz="2000" dirty="0">
+                <a:cs typeface="Times New Roman" panose="02020603050405020304" pitchFamily="18" charset="0"/>
+              </a:rPr>
+              <a:t>10</a:t>
+            </a:r>
+            <a:endParaRPr lang="en-US" dirty="0">
+              <a:cs typeface="Times New Roman" panose="02020603050405020304" pitchFamily="18" charset="0"/>
+            </a:endParaRPr>
+          </a:p>
+        </p:txBody>
+      </p:sp>
+      <p:sp>
+        <p:nvSpPr>
+          <p:cNvPr id="31" name="TextBox 30">
+            <a:extLst>
+              <a:ext uri="{FF2B5EF4-FFF2-40B4-BE49-F238E27FC236}">
+                <a16:creationId xmlns:a16="http://schemas.microsoft.com/office/drawing/2014/main" id="{FB9A1A00-3258-4CB3-A293-FD4D131AD733}"/>
+              </a:ext>
+            </a:extLst>
+          </p:cNvPr>
+          <p:cNvSpPr txBox="1"/>
+          <p:nvPr/>
+        </p:nvSpPr>
+        <p:spPr>
+          <a:xfrm>
+            <a:off x="989225" y="4294911"/>
+            <a:ext cx="464723" cy="400110"/>
+          </a:xfrm>
+          <a:prstGeom prst="rect">
+            <a:avLst/>
+          </a:prstGeom>
+          <a:noFill/>
+        </p:spPr>
+        <p:txBody>
+          <a:bodyPr wrap="square" rtlCol="0">
+            <a:spAutoFit/>
+          </a:bodyPr>
+          <a:lstStyle/>
+          <a:p>
+            <a:r>
+              <a:rPr lang="en-US" sz="2000" dirty="0">
+                <a:cs typeface="Times New Roman" panose="02020603050405020304" pitchFamily="18" charset="0"/>
+              </a:rPr>
+              <a:t>3</a:t>
+            </a:r>
+            <a:endParaRPr lang="en-US" dirty="0">
+              <a:cs typeface="Times New Roman" panose="02020603050405020304" pitchFamily="18" charset="0"/>
+            </a:endParaRPr>
+          </a:p>
+        </p:txBody>
+      </p:sp>
+      <p:sp>
+        <p:nvSpPr>
+          <p:cNvPr id="32" name="TextBox 31">
+            <a:extLst>
+              <a:ext uri="{FF2B5EF4-FFF2-40B4-BE49-F238E27FC236}">
+                <a16:creationId xmlns:a16="http://schemas.microsoft.com/office/drawing/2014/main" id="{575B2C09-BAC8-43C3-B450-37AB8C71F16E}"/>
+              </a:ext>
+            </a:extLst>
+          </p:cNvPr>
+          <p:cNvSpPr txBox="1"/>
+          <p:nvPr/>
+        </p:nvSpPr>
+        <p:spPr>
+          <a:xfrm>
+            <a:off x="898825" y="2600244"/>
+            <a:ext cx="464723" cy="400110"/>
+          </a:xfrm>
+          <a:prstGeom prst="rect">
+            <a:avLst/>
+          </a:prstGeom>
+          <a:noFill/>
+        </p:spPr>
+        <p:txBody>
+          <a:bodyPr wrap="square" rtlCol="0">
+            <a:spAutoFit/>
+          </a:bodyPr>
+          <a:lstStyle/>
+          <a:p>
+            <a:r>
+              <a:rPr lang="en-US" sz="2000" dirty="0">
+                <a:cs typeface="Times New Roman" panose="02020603050405020304" pitchFamily="18" charset="0"/>
+              </a:rPr>
+              <a:t>30</a:t>
+            </a:r>
+            <a:endParaRPr lang="en-US" dirty="0">
+              <a:cs typeface="Times New Roman" panose="02020603050405020304" pitchFamily="18" charset="0"/>
+            </a:endParaRPr>
+          </a:p>
+        </p:txBody>
+      </p:sp>
+      <p:sp>
+        <p:nvSpPr>
+          <p:cNvPr id="33" name="TextBox 32">
+            <a:extLst>
+              <a:ext uri="{FF2B5EF4-FFF2-40B4-BE49-F238E27FC236}">
+                <a16:creationId xmlns:a16="http://schemas.microsoft.com/office/drawing/2014/main" id="{72C5ADBF-EC67-46BE-A4D2-64F4F82BBF39}"/>
+              </a:ext>
+            </a:extLst>
+          </p:cNvPr>
+          <p:cNvSpPr txBox="1"/>
+          <p:nvPr/>
+        </p:nvSpPr>
+        <p:spPr>
+          <a:xfrm>
+            <a:off x="1998120" y="2332047"/>
+            <a:ext cx="464723" cy="400110"/>
+          </a:xfrm>
+          <a:prstGeom prst="rect">
+            <a:avLst/>
+          </a:prstGeom>
+          <a:noFill/>
+        </p:spPr>
+        <p:txBody>
+          <a:bodyPr wrap="square" rtlCol="0">
+            <a:spAutoFit/>
+          </a:bodyPr>
+          <a:lstStyle/>
+          <a:p>
+            <a:r>
+              <a:rPr lang="en-US" sz="2000" dirty="0">
+                <a:cs typeface="Times New Roman" panose="02020603050405020304" pitchFamily="18" charset="0"/>
+              </a:rPr>
+              <a:t>30</a:t>
+            </a:r>
+            <a:endParaRPr lang="en-US" dirty="0">
+              <a:cs typeface="Times New Roman" panose="02020603050405020304" pitchFamily="18" charset="0"/>
+            </a:endParaRPr>
+          </a:p>
+        </p:txBody>
+      </p:sp>
+      <p:sp>
+        <p:nvSpPr>
+          <p:cNvPr id="34" name="TextBox 33">
+            <a:extLst>
+              <a:ext uri="{FF2B5EF4-FFF2-40B4-BE49-F238E27FC236}">
+                <a16:creationId xmlns:a16="http://schemas.microsoft.com/office/drawing/2014/main" id="{6811D60E-55A9-4DD1-8CEA-793C3C165C48}"/>
+              </a:ext>
+            </a:extLst>
+          </p:cNvPr>
+          <p:cNvSpPr txBox="1"/>
+          <p:nvPr/>
+        </p:nvSpPr>
+        <p:spPr>
+          <a:xfrm>
+            <a:off x="3134893" y="2332047"/>
+            <a:ext cx="464723" cy="400110"/>
+          </a:xfrm>
+          <a:prstGeom prst="rect">
+            <a:avLst/>
+          </a:prstGeom>
+          <a:noFill/>
+        </p:spPr>
+        <p:txBody>
+          <a:bodyPr wrap="square" rtlCol="0">
+            <a:spAutoFit/>
+          </a:bodyPr>
+          <a:lstStyle/>
+          <a:p>
+            <a:r>
+              <a:rPr lang="en-US" sz="2000" dirty="0">
+                <a:cs typeface="Times New Roman" panose="02020603050405020304" pitchFamily="18" charset="0"/>
+              </a:rPr>
+              <a:t>30</a:t>
+            </a:r>
+            <a:endParaRPr lang="en-US" sz="1600" dirty="0">
+              <a:cs typeface="Times New Roman" panose="02020603050405020304" pitchFamily="18" charset="0"/>
+            </a:endParaRPr>
+          </a:p>
+        </p:txBody>
+      </p:sp>
+      <p:sp>
+        <p:nvSpPr>
+          <p:cNvPr id="35" name="TextBox 34">
+            <a:extLst>
+              <a:ext uri="{FF2B5EF4-FFF2-40B4-BE49-F238E27FC236}">
+                <a16:creationId xmlns:a16="http://schemas.microsoft.com/office/drawing/2014/main" id="{EA6B5252-4515-4FE6-8250-EFBC9E2E1112}"/>
+              </a:ext>
+            </a:extLst>
+          </p:cNvPr>
+          <p:cNvSpPr txBox="1"/>
+          <p:nvPr/>
+        </p:nvSpPr>
+        <p:spPr>
+          <a:xfrm>
+            <a:off x="4295795" y="2333434"/>
+            <a:ext cx="464723" cy="400110"/>
+          </a:xfrm>
+          <a:prstGeom prst="rect">
+            <a:avLst/>
+          </a:prstGeom>
+          <a:noFill/>
+        </p:spPr>
+        <p:txBody>
+          <a:bodyPr wrap="square" rtlCol="0">
+            <a:spAutoFit/>
+          </a:bodyPr>
+          <a:lstStyle/>
+          <a:p>
+            <a:r>
+              <a:rPr lang="en-US" sz="2000" dirty="0">
+                <a:cs typeface="Times New Roman" panose="02020603050405020304" pitchFamily="18" charset="0"/>
+              </a:rPr>
+              <a:t>30</a:t>
+            </a:r>
+            <a:endParaRPr lang="en-US" dirty="0">
+              <a:cs typeface="Times New Roman" panose="02020603050405020304" pitchFamily="18" charset="0"/>
+            </a:endParaRPr>
+          </a:p>
+        </p:txBody>
+      </p:sp>
+      <p:sp>
+        <p:nvSpPr>
+          <p:cNvPr id="36" name="TextBox 35">
+            <a:extLst>
+              <a:ext uri="{FF2B5EF4-FFF2-40B4-BE49-F238E27FC236}">
+                <a16:creationId xmlns:a16="http://schemas.microsoft.com/office/drawing/2014/main" id="{0D139548-DCD4-4C92-97AD-55992442D4F7}"/>
+              </a:ext>
+            </a:extLst>
+          </p:cNvPr>
+          <p:cNvSpPr txBox="1"/>
+          <p:nvPr/>
+        </p:nvSpPr>
+        <p:spPr>
+          <a:xfrm>
+            <a:off x="6453746" y="1734096"/>
+            <a:ext cx="464723" cy="400110"/>
+          </a:xfrm>
+          <a:prstGeom prst="rect">
+            <a:avLst/>
+          </a:prstGeom>
+          <a:noFill/>
+        </p:spPr>
+        <p:txBody>
+          <a:bodyPr wrap="square" rtlCol="0">
+            <a:spAutoFit/>
+          </a:bodyPr>
+          <a:lstStyle/>
+          <a:p>
+            <a:r>
+              <a:rPr lang="en-US" sz="2000" dirty="0">
+                <a:cs typeface="Times New Roman" panose="02020603050405020304" pitchFamily="18" charset="0"/>
+              </a:rPr>
+              <a:t>30</a:t>
+            </a:r>
+            <a:endParaRPr lang="en-US" dirty="0">
+              <a:cs typeface="Times New Roman" panose="02020603050405020304" pitchFamily="18" charset="0"/>
+            </a:endParaRPr>
+          </a:p>
+        </p:txBody>
+      </p:sp>
+    </p:spTree>
+    <p:extLst>
+      <p:ext uri="{BB962C8B-B14F-4D97-AF65-F5344CB8AC3E}">
+        <p14:creationId xmlns:p14="http://schemas.microsoft.com/office/powerpoint/2010/main" val="2183253832"/>
+      </p:ext>
+    </p:extLst>
+  </p:cSld>
+  <p:clrMapOvr>
+    <a:masterClrMapping/>
+  </p:clrMapOvr>
+</p:sld>
+</file>
+
+<file path=ppt/slides/slide5.xml><?xml version="1.0" encoding="utf-8"?>
+<p:sld xmlns:a="http://schemas.openxmlformats.org/drawingml/2006/main" xmlns:r="http://schemas.openxmlformats.org/officeDocument/2006/relationships" xmlns:p="http://schemas.openxmlformats.org/presentationml/2006/main">
+  <p:cSld>
+    <p:spTree>
+      <p:nvGrpSpPr>
+        <p:cNvPr id="1" name=""/>
+        <p:cNvGrpSpPr/>
+        <p:nvPr/>
+      </p:nvGrpSpPr>
+      <p:grpSpPr>
+        <a:xfrm>
+          <a:off x="0" y="0"/>
+          <a:ext cx="0" cy="0"/>
+          <a:chOff x="0" y="0"/>
+          <a:chExt cx="0" cy="0"/>
+        </a:xfrm>
+      </p:grpSpPr>
+      <p:sp>
+        <p:nvSpPr>
+          <p:cNvPr id="4" name="Oval 3">
+            <a:extLst>
+              <a:ext uri="{FF2B5EF4-FFF2-40B4-BE49-F238E27FC236}">
+                <a16:creationId xmlns:a16="http://schemas.microsoft.com/office/drawing/2014/main" id="{3FC4726B-5193-4BEE-BE5B-82B94E03C82F}"/>
+              </a:ext>
+            </a:extLst>
+          </p:cNvPr>
+          <p:cNvSpPr/>
+          <p:nvPr/>
+        </p:nvSpPr>
+        <p:spPr>
+          <a:xfrm>
+            <a:off x="655046" y="1372235"/>
+            <a:ext cx="359677" cy="341163"/>
+          </a:xfrm>
+          <a:prstGeom prst="ellipse">
+            <a:avLst/>
+          </a:prstGeom>
+          <a:solidFill>
+            <a:schemeClr val="bg1">
+              <a:lumMod val="85000"/>
+            </a:schemeClr>
+          </a:solidFill>
+          <a:ln>
+            <a:solidFill>
+              <a:schemeClr val="bg1">
+                <a:lumMod val="50000"/>
+              </a:schemeClr>
+            </a:solidFill>
+          </a:ln>
+        </p:spPr>
+        <p:style>
+          <a:lnRef idx="2">
+            <a:schemeClr val="accent1">
+              <a:shade val="50000"/>
+            </a:schemeClr>
+          </a:lnRef>
+          <a:fillRef idx="1">
+            <a:schemeClr val="accent1"/>
+          </a:fillRef>
+          <a:effectRef idx="0">
+            <a:schemeClr val="accent1"/>
+          </a:effectRef>
+          <a:fontRef idx="minor">
+            <a:schemeClr val="lt1"/>
+          </a:fontRef>
+        </p:style>
+        <p:txBody>
+          <a:bodyPr rtlCol="0" anchor="ctr"/>
+          <a:lstStyle/>
+          <a:p>
+            <a:pPr algn="ctr"/>
+            <a:endParaRPr lang="en-US"/>
+          </a:p>
+        </p:txBody>
+      </p:sp>
+      <p:sp>
+        <p:nvSpPr>
+          <p:cNvPr id="5" name="Oval 4">
+            <a:extLst>
+              <a:ext uri="{FF2B5EF4-FFF2-40B4-BE49-F238E27FC236}">
+                <a16:creationId xmlns:a16="http://schemas.microsoft.com/office/drawing/2014/main" id="{E3ADCBB0-75E0-48BE-A3AF-D086C711F9EB}"/>
+              </a:ext>
+            </a:extLst>
+          </p:cNvPr>
+          <p:cNvSpPr/>
+          <p:nvPr/>
+        </p:nvSpPr>
+        <p:spPr>
+          <a:xfrm>
+            <a:off x="1556334" y="1222986"/>
+            <a:ext cx="682306" cy="639662"/>
+          </a:xfrm>
+          <a:prstGeom prst="ellipse">
+            <a:avLst/>
+          </a:prstGeom>
+          <a:solidFill>
+            <a:schemeClr val="bg1">
+              <a:lumMod val="85000"/>
+            </a:schemeClr>
+          </a:solidFill>
+          <a:ln>
+            <a:solidFill>
+              <a:schemeClr val="bg1">
+                <a:lumMod val="50000"/>
+              </a:schemeClr>
+            </a:solidFill>
+          </a:ln>
+        </p:spPr>
+        <p:style>
+          <a:lnRef idx="2">
+            <a:schemeClr val="accent1">
+              <a:shade val="50000"/>
+            </a:schemeClr>
+          </a:lnRef>
+          <a:fillRef idx="1">
+            <a:schemeClr val="accent1"/>
+          </a:fillRef>
+          <a:effectRef idx="0">
+            <a:schemeClr val="accent1"/>
+          </a:effectRef>
+          <a:fontRef idx="minor">
+            <a:schemeClr val="lt1"/>
+          </a:fontRef>
+        </p:style>
+        <p:txBody>
+          <a:bodyPr rtlCol="0" anchor="ctr"/>
+          <a:lstStyle/>
+          <a:p>
+            <a:pPr algn="ctr"/>
+            <a:endParaRPr lang="en-US"/>
+          </a:p>
+        </p:txBody>
+      </p:sp>
+      <p:sp>
+        <p:nvSpPr>
+          <p:cNvPr id="6" name="Oval 5">
+            <a:extLst>
+              <a:ext uri="{FF2B5EF4-FFF2-40B4-BE49-F238E27FC236}">
+                <a16:creationId xmlns:a16="http://schemas.microsoft.com/office/drawing/2014/main" id="{3A6EEB0E-E088-462E-A4F5-852E9B8A5C6D}"/>
+              </a:ext>
+            </a:extLst>
+          </p:cNvPr>
+          <p:cNvSpPr/>
+          <p:nvPr/>
+        </p:nvSpPr>
+        <p:spPr>
+          <a:xfrm>
+            <a:off x="511554" y="2064679"/>
+            <a:ext cx="682307" cy="639661"/>
+          </a:xfrm>
+          <a:prstGeom prst="ellipse">
+            <a:avLst/>
+          </a:prstGeom>
+          <a:solidFill>
+            <a:schemeClr val="bg1">
+              <a:lumMod val="85000"/>
+            </a:schemeClr>
+          </a:solidFill>
+          <a:ln>
+            <a:solidFill>
+              <a:schemeClr val="bg1">
+                <a:lumMod val="50000"/>
+              </a:schemeClr>
+            </a:solidFill>
+          </a:ln>
+        </p:spPr>
+        <p:style>
+          <a:lnRef idx="2">
+            <a:schemeClr val="accent1">
+              <a:shade val="50000"/>
+            </a:schemeClr>
+          </a:lnRef>
+          <a:fillRef idx="1">
+            <a:schemeClr val="accent1"/>
+          </a:fillRef>
+          <a:effectRef idx="0">
+            <a:schemeClr val="accent1"/>
+          </a:effectRef>
+          <a:fontRef idx="minor">
+            <a:schemeClr val="lt1"/>
+          </a:fontRef>
+        </p:style>
+        <p:txBody>
+          <a:bodyPr rtlCol="0" anchor="ctr"/>
+          <a:lstStyle/>
+          <a:p>
+            <a:pPr algn="ctr"/>
+            <a:endParaRPr lang="en-US"/>
+          </a:p>
+        </p:txBody>
+      </p:sp>
+      <p:sp>
+        <p:nvSpPr>
+          <p:cNvPr id="7" name="Oval 6">
+            <a:extLst>
+              <a:ext uri="{FF2B5EF4-FFF2-40B4-BE49-F238E27FC236}">
+                <a16:creationId xmlns:a16="http://schemas.microsoft.com/office/drawing/2014/main" id="{E3E702AD-0FB1-4F6F-9E51-0939EFC0D8CE}"/>
+              </a:ext>
+            </a:extLst>
+          </p:cNvPr>
+          <p:cNvSpPr/>
+          <p:nvPr/>
+        </p:nvSpPr>
+        <p:spPr>
+          <a:xfrm>
+            <a:off x="1556334" y="2064680"/>
+            <a:ext cx="682306" cy="639661"/>
+          </a:xfrm>
+          <a:prstGeom prst="ellipse">
+            <a:avLst/>
+          </a:prstGeom>
+          <a:solidFill>
+            <a:schemeClr val="bg1">
+              <a:lumMod val="85000"/>
+            </a:schemeClr>
+          </a:solidFill>
+          <a:ln>
+            <a:solidFill>
+              <a:schemeClr val="bg1">
+                <a:lumMod val="50000"/>
+              </a:schemeClr>
+            </a:solidFill>
+          </a:ln>
+        </p:spPr>
+        <p:style>
+          <a:lnRef idx="2">
+            <a:schemeClr val="accent1">
+              <a:shade val="50000"/>
+            </a:schemeClr>
+          </a:lnRef>
+          <a:fillRef idx="1">
+            <a:schemeClr val="accent1"/>
+          </a:fillRef>
+          <a:effectRef idx="0">
+            <a:schemeClr val="accent1"/>
+          </a:effectRef>
+          <a:fontRef idx="minor">
+            <a:schemeClr val="lt1"/>
+          </a:fontRef>
+        </p:style>
+        <p:txBody>
+          <a:bodyPr rtlCol="0" anchor="ctr"/>
+          <a:lstStyle/>
+          <a:p>
+            <a:pPr algn="ctr"/>
+            <a:endParaRPr lang="en-US"/>
+          </a:p>
+        </p:txBody>
+      </p:sp>
+      <p:sp>
+        <p:nvSpPr>
+          <p:cNvPr id="8" name="Oval 7">
+            <a:extLst>
+              <a:ext uri="{FF2B5EF4-FFF2-40B4-BE49-F238E27FC236}">
+                <a16:creationId xmlns:a16="http://schemas.microsoft.com/office/drawing/2014/main" id="{A26A0D3D-49B4-4978-A7FF-E3294D84F228}"/>
+              </a:ext>
+            </a:extLst>
+          </p:cNvPr>
+          <p:cNvSpPr/>
+          <p:nvPr/>
+        </p:nvSpPr>
+        <p:spPr>
+          <a:xfrm>
+            <a:off x="271949" y="2906373"/>
+            <a:ext cx="2125211" cy="1990987"/>
+          </a:xfrm>
+          <a:prstGeom prst="ellipse">
+            <a:avLst/>
+          </a:prstGeom>
+          <a:solidFill>
+            <a:schemeClr val="bg1">
+              <a:lumMod val="85000"/>
+            </a:schemeClr>
+          </a:solidFill>
+          <a:ln>
+            <a:solidFill>
+              <a:schemeClr val="bg1">
+                <a:lumMod val="50000"/>
+              </a:schemeClr>
+            </a:solidFill>
+          </a:ln>
+        </p:spPr>
+        <p:style>
+          <a:lnRef idx="2">
+            <a:schemeClr val="accent1">
+              <a:shade val="50000"/>
+            </a:schemeClr>
+          </a:lnRef>
+          <a:fillRef idx="1">
+            <a:schemeClr val="accent1"/>
+          </a:fillRef>
+          <a:effectRef idx="0">
+            <a:schemeClr val="accent1"/>
+          </a:effectRef>
+          <a:fontRef idx="minor">
+            <a:schemeClr val="lt1"/>
+          </a:fontRef>
+        </p:style>
+        <p:txBody>
+          <a:bodyPr rtlCol="0" anchor="ctr"/>
+          <a:lstStyle/>
+          <a:p>
+            <a:pPr algn="ctr"/>
+            <a:endParaRPr lang="en-US"/>
+          </a:p>
+        </p:txBody>
+      </p:sp>
+      <p:sp>
+        <p:nvSpPr>
+          <p:cNvPr id="9" name="Oval 8">
+            <a:extLst>
+              <a:ext uri="{FF2B5EF4-FFF2-40B4-BE49-F238E27FC236}">
+                <a16:creationId xmlns:a16="http://schemas.microsoft.com/office/drawing/2014/main" id="{54B4D834-75B2-42CF-A943-3E5036E72388}"/>
+              </a:ext>
+            </a:extLst>
+          </p:cNvPr>
+          <p:cNvSpPr/>
+          <p:nvPr/>
+        </p:nvSpPr>
+        <p:spPr>
+          <a:xfrm>
+            <a:off x="4134626" y="1164965"/>
+            <a:ext cx="916499" cy="882933"/>
+          </a:xfrm>
+          <a:prstGeom prst="ellipse">
+            <a:avLst/>
+          </a:prstGeom>
+          <a:solidFill>
+            <a:schemeClr val="bg1">
+              <a:lumMod val="85000"/>
+            </a:schemeClr>
+          </a:solidFill>
+          <a:ln>
+            <a:solidFill>
+              <a:schemeClr val="bg1">
+                <a:lumMod val="50000"/>
+              </a:schemeClr>
+            </a:solidFill>
+          </a:ln>
+        </p:spPr>
+        <p:style>
+          <a:lnRef idx="2">
+            <a:schemeClr val="accent1">
+              <a:shade val="50000"/>
+            </a:schemeClr>
+          </a:lnRef>
+          <a:fillRef idx="1">
+            <a:schemeClr val="accent1"/>
+          </a:fillRef>
+          <a:effectRef idx="0">
+            <a:schemeClr val="accent1"/>
+          </a:effectRef>
+          <a:fontRef idx="minor">
+            <a:schemeClr val="lt1"/>
+          </a:fontRef>
+        </p:style>
+        <p:txBody>
+          <a:bodyPr rtlCol="0" anchor="ctr"/>
+          <a:lstStyle/>
+          <a:p>
+            <a:pPr algn="ctr"/>
+            <a:endParaRPr lang="en-US" dirty="0"/>
+          </a:p>
+        </p:txBody>
+      </p:sp>
+      <p:sp>
+        <p:nvSpPr>
+          <p:cNvPr id="10" name="Oval 9">
+            <a:extLst>
+              <a:ext uri="{FF2B5EF4-FFF2-40B4-BE49-F238E27FC236}">
+                <a16:creationId xmlns:a16="http://schemas.microsoft.com/office/drawing/2014/main" id="{FAFA184F-4DE4-4D83-9734-8C3B796B17E5}"/>
+              </a:ext>
+            </a:extLst>
+          </p:cNvPr>
+          <p:cNvSpPr/>
+          <p:nvPr/>
+        </p:nvSpPr>
+        <p:spPr>
+          <a:xfrm>
+            <a:off x="3062239" y="1388312"/>
+            <a:ext cx="682306" cy="639661"/>
+          </a:xfrm>
+          <a:prstGeom prst="ellipse">
+            <a:avLst/>
+          </a:prstGeom>
+          <a:solidFill>
+            <a:schemeClr val="bg1">
+              <a:lumMod val="85000"/>
+            </a:schemeClr>
+          </a:solidFill>
+          <a:ln>
+            <a:solidFill>
+              <a:schemeClr val="bg1">
+                <a:lumMod val="50000"/>
+              </a:schemeClr>
+            </a:solidFill>
+          </a:ln>
+        </p:spPr>
+        <p:style>
+          <a:lnRef idx="2">
+            <a:schemeClr val="accent1">
+              <a:shade val="50000"/>
+            </a:schemeClr>
+          </a:lnRef>
+          <a:fillRef idx="1">
+            <a:schemeClr val="accent1"/>
+          </a:fillRef>
+          <a:effectRef idx="0">
+            <a:schemeClr val="accent1"/>
+          </a:effectRef>
+          <a:fontRef idx="minor">
+            <a:schemeClr val="lt1"/>
+          </a:fontRef>
+        </p:style>
+        <p:txBody>
+          <a:bodyPr rtlCol="0" anchor="ctr"/>
+          <a:lstStyle/>
+          <a:p>
+            <a:pPr algn="ctr"/>
+            <a:endParaRPr lang="en-US"/>
+          </a:p>
+        </p:txBody>
+      </p:sp>
+      <p:sp>
+        <p:nvSpPr>
+          <p:cNvPr id="11" name="Oval 10">
+            <a:extLst>
+              <a:ext uri="{FF2B5EF4-FFF2-40B4-BE49-F238E27FC236}">
+                <a16:creationId xmlns:a16="http://schemas.microsoft.com/office/drawing/2014/main" id="{4B7EE8C8-99E7-4AE0-94FE-856FB6846100}"/>
+              </a:ext>
+            </a:extLst>
+          </p:cNvPr>
+          <p:cNvSpPr/>
+          <p:nvPr/>
+        </p:nvSpPr>
+        <p:spPr>
+          <a:xfrm>
+            <a:off x="2934396" y="2245044"/>
+            <a:ext cx="937992" cy="882238"/>
+          </a:xfrm>
+          <a:prstGeom prst="ellipse">
+            <a:avLst/>
+          </a:prstGeom>
+          <a:solidFill>
+            <a:schemeClr val="bg1">
+              <a:lumMod val="85000"/>
+            </a:schemeClr>
+          </a:solidFill>
+          <a:ln>
+            <a:solidFill>
+              <a:schemeClr val="bg1">
+                <a:lumMod val="50000"/>
+              </a:schemeClr>
+            </a:solidFill>
+          </a:ln>
+        </p:spPr>
+        <p:style>
+          <a:lnRef idx="2">
+            <a:schemeClr val="accent1">
+              <a:shade val="50000"/>
+            </a:schemeClr>
+          </a:lnRef>
+          <a:fillRef idx="1">
+            <a:schemeClr val="accent1"/>
+          </a:fillRef>
+          <a:effectRef idx="0">
+            <a:schemeClr val="accent1"/>
+          </a:effectRef>
+          <a:fontRef idx="minor">
+            <a:schemeClr val="lt1"/>
+          </a:fontRef>
+        </p:style>
+        <p:txBody>
+          <a:bodyPr rtlCol="0" anchor="ctr"/>
+          <a:lstStyle/>
+          <a:p>
+            <a:pPr algn="ctr"/>
+            <a:endParaRPr lang="en-US"/>
+          </a:p>
+        </p:txBody>
+      </p:sp>
+      <p:sp>
+        <p:nvSpPr>
+          <p:cNvPr id="12" name="Oval 11">
+            <a:extLst>
+              <a:ext uri="{FF2B5EF4-FFF2-40B4-BE49-F238E27FC236}">
+                <a16:creationId xmlns:a16="http://schemas.microsoft.com/office/drawing/2014/main" id="{72B6611D-4591-43AB-88AA-A71EC94C9783}"/>
+              </a:ext>
+            </a:extLst>
+          </p:cNvPr>
+          <p:cNvSpPr/>
+          <p:nvPr/>
+        </p:nvSpPr>
+        <p:spPr>
+          <a:xfrm>
+            <a:off x="4123881" y="2244348"/>
+            <a:ext cx="937991" cy="882933"/>
+          </a:xfrm>
+          <a:prstGeom prst="ellipse">
+            <a:avLst/>
+          </a:prstGeom>
+          <a:solidFill>
+            <a:schemeClr val="bg1">
+              <a:lumMod val="85000"/>
+            </a:schemeClr>
+          </a:solidFill>
+          <a:ln>
+            <a:solidFill>
+              <a:schemeClr val="bg1">
+                <a:lumMod val="50000"/>
+              </a:schemeClr>
+            </a:solidFill>
+          </a:ln>
+        </p:spPr>
+        <p:style>
+          <a:lnRef idx="2">
+            <a:schemeClr val="accent1">
+              <a:shade val="50000"/>
+            </a:schemeClr>
+          </a:lnRef>
+          <a:fillRef idx="1">
+            <a:schemeClr val="accent1"/>
+          </a:fillRef>
+          <a:effectRef idx="0">
+            <a:schemeClr val="accent1"/>
+          </a:effectRef>
+          <a:fontRef idx="minor">
+            <a:schemeClr val="lt1"/>
+          </a:fontRef>
+        </p:style>
+        <p:txBody>
+          <a:bodyPr rtlCol="0" anchor="ctr"/>
+          <a:lstStyle/>
+          <a:p>
+            <a:pPr algn="ctr"/>
+            <a:endParaRPr lang="en-US"/>
+          </a:p>
+        </p:txBody>
+      </p:sp>
+      <p:sp>
+        <p:nvSpPr>
+          <p:cNvPr id="13" name="Oval 12">
+            <a:extLst>
+              <a:ext uri="{FF2B5EF4-FFF2-40B4-BE49-F238E27FC236}">
+                <a16:creationId xmlns:a16="http://schemas.microsoft.com/office/drawing/2014/main" id="{D17B1C3B-BFA5-49B3-96E4-0E049D534FA6}"/>
+              </a:ext>
+            </a:extLst>
+          </p:cNvPr>
+          <p:cNvSpPr/>
+          <p:nvPr/>
+        </p:nvSpPr>
+        <p:spPr>
+          <a:xfrm>
+            <a:off x="3250382" y="3302755"/>
+            <a:ext cx="1554759" cy="1430323"/>
+          </a:xfrm>
+          <a:prstGeom prst="ellipse">
+            <a:avLst/>
+          </a:prstGeom>
+          <a:solidFill>
+            <a:schemeClr val="bg1">
+              <a:lumMod val="85000"/>
+            </a:schemeClr>
+          </a:solidFill>
+          <a:ln>
+            <a:solidFill>
+              <a:schemeClr val="bg1">
+                <a:lumMod val="50000"/>
+              </a:schemeClr>
+            </a:solidFill>
+          </a:ln>
+        </p:spPr>
+        <p:style>
+          <a:lnRef idx="2">
+            <a:schemeClr val="accent1">
+              <a:shade val="50000"/>
+            </a:schemeClr>
+          </a:lnRef>
+          <a:fillRef idx="1">
+            <a:schemeClr val="accent1"/>
+          </a:fillRef>
+          <a:effectRef idx="0">
+            <a:schemeClr val="accent1"/>
+          </a:effectRef>
+          <a:fontRef idx="minor">
+            <a:schemeClr val="lt1"/>
+          </a:fontRef>
+        </p:style>
+        <p:txBody>
+          <a:bodyPr rtlCol="0" anchor="ctr"/>
+          <a:lstStyle/>
+          <a:p>
+            <a:pPr algn="ctr"/>
+            <a:endParaRPr lang="en-US"/>
+          </a:p>
+        </p:txBody>
+      </p:sp>
+      <p:sp>
+        <p:nvSpPr>
+          <p:cNvPr id="14" name="Oval 13">
+            <a:extLst>
+              <a:ext uri="{FF2B5EF4-FFF2-40B4-BE49-F238E27FC236}">
+                <a16:creationId xmlns:a16="http://schemas.microsoft.com/office/drawing/2014/main" id="{C4EEFD26-4FED-45E1-A317-B025B1C6E6BD}"/>
+              </a:ext>
+            </a:extLst>
+          </p:cNvPr>
+          <p:cNvSpPr/>
+          <p:nvPr/>
+        </p:nvSpPr>
+        <p:spPr>
+          <a:xfrm>
+            <a:off x="5612923" y="1400549"/>
+            <a:ext cx="1001088" cy="935372"/>
+          </a:xfrm>
+          <a:prstGeom prst="ellipse">
+            <a:avLst/>
+          </a:prstGeom>
+          <a:solidFill>
+            <a:schemeClr val="bg1">
+              <a:lumMod val="85000"/>
+            </a:schemeClr>
+          </a:solidFill>
+          <a:ln>
+            <a:solidFill>
+              <a:schemeClr val="bg1">
+                <a:lumMod val="50000"/>
+              </a:schemeClr>
+            </a:solidFill>
+          </a:ln>
+        </p:spPr>
+        <p:style>
+          <a:lnRef idx="2">
+            <a:schemeClr val="accent1">
+              <a:shade val="50000"/>
+            </a:schemeClr>
+          </a:lnRef>
+          <a:fillRef idx="1">
+            <a:schemeClr val="accent1"/>
+          </a:fillRef>
+          <a:effectRef idx="0">
+            <a:schemeClr val="accent1"/>
+          </a:effectRef>
+          <a:fontRef idx="minor">
+            <a:schemeClr val="lt1"/>
+          </a:fontRef>
+        </p:style>
+        <p:txBody>
+          <a:bodyPr rtlCol="0" anchor="ctr"/>
+          <a:lstStyle/>
+          <a:p>
+            <a:pPr algn="ctr"/>
+            <a:endParaRPr lang="en-US"/>
+          </a:p>
+        </p:txBody>
+      </p:sp>
+      <p:sp>
+        <p:nvSpPr>
+          <p:cNvPr id="15" name="Oval 14">
+            <a:extLst>
+              <a:ext uri="{FF2B5EF4-FFF2-40B4-BE49-F238E27FC236}">
+                <a16:creationId xmlns:a16="http://schemas.microsoft.com/office/drawing/2014/main" id="{5CC64B16-311D-4D02-9CFD-5741974BDF13}"/>
+              </a:ext>
+            </a:extLst>
+          </p:cNvPr>
+          <p:cNvSpPr/>
+          <p:nvPr/>
+        </p:nvSpPr>
+        <p:spPr>
+          <a:xfrm>
+            <a:off x="6888047" y="1400549"/>
+            <a:ext cx="1001088" cy="935372"/>
+          </a:xfrm>
+          <a:prstGeom prst="ellipse">
+            <a:avLst/>
+          </a:prstGeom>
+          <a:solidFill>
+            <a:schemeClr val="bg1">
+              <a:lumMod val="85000"/>
+            </a:schemeClr>
+          </a:solidFill>
+          <a:ln>
+            <a:solidFill>
+              <a:schemeClr val="bg1">
+                <a:lumMod val="50000"/>
+              </a:schemeClr>
+            </a:solidFill>
+          </a:ln>
+        </p:spPr>
+        <p:style>
+          <a:lnRef idx="2">
+            <a:schemeClr val="accent1">
+              <a:shade val="50000"/>
+            </a:schemeClr>
+          </a:lnRef>
+          <a:fillRef idx="1">
+            <a:schemeClr val="accent1"/>
+          </a:fillRef>
+          <a:effectRef idx="0">
+            <a:schemeClr val="accent1"/>
+          </a:effectRef>
+          <a:fontRef idx="minor">
+            <a:schemeClr val="lt1"/>
+          </a:fontRef>
+        </p:style>
+        <p:txBody>
+          <a:bodyPr rtlCol="0" anchor="ctr"/>
+          <a:lstStyle/>
+          <a:p>
+            <a:pPr algn="ctr"/>
+            <a:endParaRPr lang="en-US"/>
+          </a:p>
+        </p:txBody>
+      </p:sp>
+      <p:sp>
+        <p:nvSpPr>
+          <p:cNvPr id="16" name="Oval 15">
+            <a:extLst>
+              <a:ext uri="{FF2B5EF4-FFF2-40B4-BE49-F238E27FC236}">
+                <a16:creationId xmlns:a16="http://schemas.microsoft.com/office/drawing/2014/main" id="{099E9B1D-18AC-43EE-BEE4-F943C6CE5644}"/>
+              </a:ext>
+            </a:extLst>
+          </p:cNvPr>
+          <p:cNvSpPr/>
+          <p:nvPr/>
+        </p:nvSpPr>
+        <p:spPr>
+          <a:xfrm>
+            <a:off x="5612923" y="2590216"/>
+            <a:ext cx="1001088" cy="935372"/>
+          </a:xfrm>
+          <a:prstGeom prst="ellipse">
+            <a:avLst/>
+          </a:prstGeom>
+          <a:solidFill>
+            <a:schemeClr val="bg1">
+              <a:lumMod val="85000"/>
+            </a:schemeClr>
+          </a:solidFill>
+          <a:ln>
+            <a:solidFill>
+              <a:schemeClr val="bg1">
+                <a:lumMod val="50000"/>
+              </a:schemeClr>
+            </a:solidFill>
+          </a:ln>
+        </p:spPr>
+        <p:style>
+          <a:lnRef idx="2">
+            <a:schemeClr val="accent1">
+              <a:shade val="50000"/>
+            </a:schemeClr>
+          </a:lnRef>
+          <a:fillRef idx="1">
+            <a:schemeClr val="accent1"/>
+          </a:fillRef>
+          <a:effectRef idx="0">
+            <a:schemeClr val="accent1"/>
+          </a:effectRef>
+          <a:fontRef idx="minor">
+            <a:schemeClr val="lt1"/>
+          </a:fontRef>
+        </p:style>
+        <p:txBody>
+          <a:bodyPr rtlCol="0" anchor="ctr"/>
+          <a:lstStyle/>
+          <a:p>
+            <a:pPr algn="ctr"/>
+            <a:endParaRPr lang="en-US"/>
+          </a:p>
+        </p:txBody>
+      </p:sp>
+      <p:sp>
+        <p:nvSpPr>
+          <p:cNvPr id="17" name="Oval 16">
+            <a:extLst>
+              <a:ext uri="{FF2B5EF4-FFF2-40B4-BE49-F238E27FC236}">
+                <a16:creationId xmlns:a16="http://schemas.microsoft.com/office/drawing/2014/main" id="{FFB33A01-B49E-42A3-835A-F83658D5F1B8}"/>
+              </a:ext>
+            </a:extLst>
+          </p:cNvPr>
+          <p:cNvSpPr/>
+          <p:nvPr/>
+        </p:nvSpPr>
+        <p:spPr>
+          <a:xfrm>
+            <a:off x="6888047" y="2573961"/>
+            <a:ext cx="1001088" cy="935372"/>
+          </a:xfrm>
+          <a:prstGeom prst="ellipse">
+            <a:avLst/>
+          </a:prstGeom>
+          <a:solidFill>
+            <a:schemeClr val="bg1">
+              <a:lumMod val="85000"/>
+            </a:schemeClr>
+          </a:solidFill>
+          <a:ln>
+            <a:solidFill>
+              <a:schemeClr val="bg1">
+                <a:lumMod val="50000"/>
+              </a:schemeClr>
+            </a:solidFill>
+          </a:ln>
+        </p:spPr>
+        <p:style>
+          <a:lnRef idx="2">
+            <a:schemeClr val="accent1">
+              <a:shade val="50000"/>
+            </a:schemeClr>
+          </a:lnRef>
+          <a:fillRef idx="1">
+            <a:schemeClr val="accent1"/>
+          </a:fillRef>
+          <a:effectRef idx="0">
+            <a:schemeClr val="accent1"/>
+          </a:effectRef>
+          <a:fontRef idx="minor">
+            <a:schemeClr val="lt1"/>
+          </a:fontRef>
+        </p:style>
+        <p:txBody>
+          <a:bodyPr rtlCol="0" anchor="ctr"/>
+          <a:lstStyle/>
+          <a:p>
+            <a:pPr algn="ctr"/>
+            <a:endParaRPr lang="en-US"/>
+          </a:p>
+        </p:txBody>
+      </p:sp>
+      <p:sp>
+        <p:nvSpPr>
+          <p:cNvPr id="18" name="Oval 17">
+            <a:extLst>
+              <a:ext uri="{FF2B5EF4-FFF2-40B4-BE49-F238E27FC236}">
+                <a16:creationId xmlns:a16="http://schemas.microsoft.com/office/drawing/2014/main" id="{E5AB1DC9-1CB4-4CC2-A6A0-B0598AAEF94A}"/>
+              </a:ext>
+            </a:extLst>
+          </p:cNvPr>
+          <p:cNvSpPr/>
+          <p:nvPr/>
+        </p:nvSpPr>
+        <p:spPr>
+          <a:xfrm>
+            <a:off x="6251882" y="3651248"/>
+            <a:ext cx="1001088" cy="964383"/>
+          </a:xfrm>
+          <a:prstGeom prst="ellipse">
+            <a:avLst/>
+          </a:prstGeom>
+          <a:solidFill>
+            <a:schemeClr val="bg1">
+              <a:lumMod val="85000"/>
+            </a:schemeClr>
+          </a:solidFill>
+          <a:ln>
+            <a:solidFill>
+              <a:schemeClr val="bg1">
+                <a:lumMod val="50000"/>
+              </a:schemeClr>
+            </a:solidFill>
+          </a:ln>
+        </p:spPr>
+        <p:style>
+          <a:lnRef idx="2">
+            <a:schemeClr val="accent1">
+              <a:shade val="50000"/>
+            </a:schemeClr>
+          </a:lnRef>
+          <a:fillRef idx="1">
+            <a:schemeClr val="accent1"/>
+          </a:fillRef>
+          <a:effectRef idx="0">
+            <a:schemeClr val="accent1"/>
+          </a:effectRef>
+          <a:fontRef idx="minor">
+            <a:schemeClr val="lt1"/>
+          </a:fontRef>
+        </p:style>
+        <p:txBody>
+          <a:bodyPr rtlCol="0" anchor="ctr"/>
+          <a:lstStyle/>
+          <a:p>
+            <a:pPr algn="ctr"/>
+            <a:endParaRPr lang="en-US"/>
+          </a:p>
+        </p:txBody>
+      </p:sp>
+      <p:sp>
+        <p:nvSpPr>
+          <p:cNvPr id="19" name="TextBox 18">
+            <a:extLst>
+              <a:ext uri="{FF2B5EF4-FFF2-40B4-BE49-F238E27FC236}">
+                <a16:creationId xmlns:a16="http://schemas.microsoft.com/office/drawing/2014/main" id="{F087E5CA-F00E-4B79-B8A7-CE56B7A1C548}"/>
+              </a:ext>
+            </a:extLst>
+          </p:cNvPr>
+          <p:cNvSpPr txBox="1"/>
+          <p:nvPr/>
+        </p:nvSpPr>
+        <p:spPr>
+          <a:xfrm>
+            <a:off x="741660" y="5297240"/>
+            <a:ext cx="1359016" cy="369332"/>
+          </a:xfrm>
+          <a:prstGeom prst="rect">
+            <a:avLst/>
+          </a:prstGeom>
+          <a:noFill/>
+        </p:spPr>
+        <p:txBody>
+          <a:bodyPr wrap="square" rtlCol="0">
+            <a:spAutoFit/>
+          </a:bodyPr>
+          <a:lstStyle/>
+          <a:p>
+            <a:r>
+              <a:rPr lang="en-US" b="1" dirty="0">
+                <a:cs typeface="Times New Roman" panose="02020603050405020304" pitchFamily="18" charset="0"/>
+              </a:rPr>
+              <a:t>Scenario 1</a:t>
+            </a:r>
+          </a:p>
+        </p:txBody>
+      </p:sp>
+      <p:sp>
+        <p:nvSpPr>
+          <p:cNvPr id="20" name="TextBox 19">
+            <a:extLst>
+              <a:ext uri="{FF2B5EF4-FFF2-40B4-BE49-F238E27FC236}">
+                <a16:creationId xmlns:a16="http://schemas.microsoft.com/office/drawing/2014/main" id="{56F2D36F-1588-470B-A8FD-AAB1A7AD4441}"/>
+              </a:ext>
+            </a:extLst>
+          </p:cNvPr>
+          <p:cNvSpPr txBox="1"/>
+          <p:nvPr/>
+        </p:nvSpPr>
+        <p:spPr>
+          <a:xfrm>
+            <a:off x="3455118" y="5297240"/>
+            <a:ext cx="1359016" cy="369332"/>
+          </a:xfrm>
+          <a:prstGeom prst="rect">
+            <a:avLst/>
+          </a:prstGeom>
+          <a:noFill/>
+        </p:spPr>
+        <p:txBody>
+          <a:bodyPr wrap="square" rtlCol="0">
+            <a:spAutoFit/>
+          </a:bodyPr>
+          <a:lstStyle/>
+          <a:p>
+            <a:r>
+              <a:rPr lang="en-US" b="1" dirty="0">
+                <a:cs typeface="Times New Roman" panose="02020603050405020304" pitchFamily="18" charset="0"/>
+              </a:rPr>
+              <a:t>Scenario 5</a:t>
+            </a:r>
+          </a:p>
+        </p:txBody>
+      </p:sp>
+      <p:sp>
+        <p:nvSpPr>
+          <p:cNvPr id="21" name="TextBox 20">
+            <a:extLst>
+              <a:ext uri="{FF2B5EF4-FFF2-40B4-BE49-F238E27FC236}">
+                <a16:creationId xmlns:a16="http://schemas.microsoft.com/office/drawing/2014/main" id="{729D5B5B-56F3-4AD5-B93B-EF2932C65BE4}"/>
+              </a:ext>
+            </a:extLst>
+          </p:cNvPr>
+          <p:cNvSpPr txBox="1"/>
+          <p:nvPr/>
+        </p:nvSpPr>
+        <p:spPr>
+          <a:xfrm>
+            <a:off x="6208539" y="5297240"/>
+            <a:ext cx="1359016" cy="369332"/>
+          </a:xfrm>
+          <a:prstGeom prst="rect">
+            <a:avLst/>
+          </a:prstGeom>
+          <a:noFill/>
+        </p:spPr>
+        <p:txBody>
+          <a:bodyPr wrap="square" rtlCol="0">
+            <a:spAutoFit/>
+          </a:bodyPr>
+          <a:lstStyle/>
+          <a:p>
+            <a:r>
+              <a:rPr lang="en-US" b="1" dirty="0">
+                <a:cs typeface="Times New Roman" panose="02020603050405020304" pitchFamily="18" charset="0"/>
+              </a:rPr>
+              <a:t>Scenario 9</a:t>
+            </a:r>
+          </a:p>
+        </p:txBody>
+      </p:sp>
+      <p:sp>
+        <p:nvSpPr>
+          <p:cNvPr id="22" name="TextBox 21">
+            <a:extLst>
+              <a:ext uri="{FF2B5EF4-FFF2-40B4-BE49-F238E27FC236}">
+                <a16:creationId xmlns:a16="http://schemas.microsoft.com/office/drawing/2014/main" id="{124A2AE3-FA06-47C3-B3CC-B0170728D824}"/>
+              </a:ext>
+            </a:extLst>
+          </p:cNvPr>
+          <p:cNvSpPr txBox="1"/>
+          <p:nvPr/>
+        </p:nvSpPr>
+        <p:spPr>
+          <a:xfrm>
+            <a:off x="992006" y="3717200"/>
+            <a:ext cx="670059" cy="369332"/>
+          </a:xfrm>
+          <a:prstGeom prst="rect">
+            <a:avLst/>
+          </a:prstGeom>
+          <a:noFill/>
+        </p:spPr>
+        <p:txBody>
+          <a:bodyPr wrap="square" rtlCol="0">
+            <a:spAutoFit/>
+          </a:bodyPr>
+          <a:lstStyle/>
+          <a:p>
+            <a:r>
+              <a:rPr lang="en-US" dirty="0">
+                <a:cs typeface="Times New Roman" panose="02020603050405020304" pitchFamily="18" charset="0"/>
+              </a:rPr>
+              <a:t>1170</a:t>
+            </a:r>
+          </a:p>
+        </p:txBody>
+      </p:sp>
+      <p:sp>
+        <p:nvSpPr>
+          <p:cNvPr id="23" name="TextBox 22">
+            <a:extLst>
+              <a:ext uri="{FF2B5EF4-FFF2-40B4-BE49-F238E27FC236}">
+                <a16:creationId xmlns:a16="http://schemas.microsoft.com/office/drawing/2014/main" id="{12084E9B-EA81-471D-B52D-937AA084F016}"/>
+              </a:ext>
+            </a:extLst>
+          </p:cNvPr>
+          <p:cNvSpPr txBox="1"/>
+          <p:nvPr/>
+        </p:nvSpPr>
+        <p:spPr>
+          <a:xfrm>
+            <a:off x="1609119" y="2199843"/>
+            <a:ext cx="670059" cy="369332"/>
+          </a:xfrm>
+          <a:prstGeom prst="rect">
+            <a:avLst/>
+          </a:prstGeom>
+          <a:noFill/>
+        </p:spPr>
+        <p:txBody>
+          <a:bodyPr wrap="square" rtlCol="0">
+            <a:spAutoFit/>
+          </a:bodyPr>
+          <a:lstStyle/>
+          <a:p>
+            <a:r>
+              <a:rPr lang="en-US" dirty="0">
+                <a:cs typeface="Times New Roman" panose="02020603050405020304" pitchFamily="18" charset="0"/>
+              </a:rPr>
+              <a:t>100</a:t>
+            </a:r>
+          </a:p>
+        </p:txBody>
+      </p:sp>
+      <p:sp>
+        <p:nvSpPr>
+          <p:cNvPr id="24" name="TextBox 23">
+            <a:extLst>
+              <a:ext uri="{FF2B5EF4-FFF2-40B4-BE49-F238E27FC236}">
+                <a16:creationId xmlns:a16="http://schemas.microsoft.com/office/drawing/2014/main" id="{3A116022-C7A5-4BC8-91EC-46932696FC71}"/>
+              </a:ext>
+            </a:extLst>
+          </p:cNvPr>
+          <p:cNvSpPr txBox="1"/>
+          <p:nvPr/>
+        </p:nvSpPr>
+        <p:spPr>
+          <a:xfrm>
+            <a:off x="567676" y="2191449"/>
+            <a:ext cx="670059" cy="369332"/>
+          </a:xfrm>
+          <a:prstGeom prst="rect">
+            <a:avLst/>
+          </a:prstGeom>
+          <a:noFill/>
+        </p:spPr>
+        <p:txBody>
+          <a:bodyPr wrap="square" rtlCol="0">
+            <a:spAutoFit/>
+          </a:bodyPr>
+          <a:lstStyle/>
+          <a:p>
+            <a:r>
+              <a:rPr lang="en-US" dirty="0">
+                <a:cs typeface="Times New Roman" panose="02020603050405020304" pitchFamily="18" charset="0"/>
+              </a:rPr>
+              <a:t>100</a:t>
+            </a:r>
+          </a:p>
+        </p:txBody>
+      </p:sp>
+      <p:sp>
+        <p:nvSpPr>
+          <p:cNvPr id="25" name="TextBox 24">
+            <a:extLst>
+              <a:ext uri="{FF2B5EF4-FFF2-40B4-BE49-F238E27FC236}">
+                <a16:creationId xmlns:a16="http://schemas.microsoft.com/office/drawing/2014/main" id="{E9AD7B33-B4B8-4A7B-BE78-BEC924B6BD29}"/>
+              </a:ext>
+            </a:extLst>
+          </p:cNvPr>
+          <p:cNvSpPr txBox="1"/>
+          <p:nvPr/>
+        </p:nvSpPr>
+        <p:spPr>
+          <a:xfrm>
+            <a:off x="1618305" y="1362221"/>
+            <a:ext cx="670059" cy="369332"/>
+          </a:xfrm>
+          <a:prstGeom prst="rect">
+            <a:avLst/>
+          </a:prstGeom>
+          <a:noFill/>
+        </p:spPr>
+        <p:txBody>
+          <a:bodyPr wrap="square" rtlCol="0">
+            <a:spAutoFit/>
+          </a:bodyPr>
+          <a:lstStyle/>
+          <a:p>
+            <a:r>
+              <a:rPr lang="en-US" dirty="0">
+                <a:cs typeface="Times New Roman" panose="02020603050405020304" pitchFamily="18" charset="0"/>
+              </a:rPr>
+              <a:t>100</a:t>
+            </a:r>
+          </a:p>
+        </p:txBody>
+      </p:sp>
+      <p:sp>
+        <p:nvSpPr>
+          <p:cNvPr id="26" name="TextBox 25">
+            <a:extLst>
+              <a:ext uri="{FF2B5EF4-FFF2-40B4-BE49-F238E27FC236}">
+                <a16:creationId xmlns:a16="http://schemas.microsoft.com/office/drawing/2014/main" id="{DBFBA754-6B7D-4EBD-9EE7-978CD07F2639}"/>
+              </a:ext>
+            </a:extLst>
+          </p:cNvPr>
+          <p:cNvSpPr txBox="1"/>
+          <p:nvPr/>
+        </p:nvSpPr>
+        <p:spPr>
+          <a:xfrm>
+            <a:off x="627866" y="1354450"/>
+            <a:ext cx="670059" cy="369332"/>
+          </a:xfrm>
+          <a:prstGeom prst="rect">
+            <a:avLst/>
+          </a:prstGeom>
+          <a:noFill/>
+        </p:spPr>
+        <p:txBody>
+          <a:bodyPr wrap="square" rtlCol="0">
+            <a:spAutoFit/>
+          </a:bodyPr>
+          <a:lstStyle/>
+          <a:p>
+            <a:r>
+              <a:rPr lang="en-US" dirty="0">
+                <a:cs typeface="Times New Roman" panose="02020603050405020304" pitchFamily="18" charset="0"/>
+              </a:rPr>
+              <a:t>30</a:t>
+            </a:r>
+          </a:p>
+        </p:txBody>
+      </p:sp>
+      <p:sp>
+        <p:nvSpPr>
+          <p:cNvPr id="27" name="TextBox 26">
+            <a:extLst>
+              <a:ext uri="{FF2B5EF4-FFF2-40B4-BE49-F238E27FC236}">
+                <a16:creationId xmlns:a16="http://schemas.microsoft.com/office/drawing/2014/main" id="{EC9B8014-B036-440C-915D-21E7FF4F7334}"/>
+              </a:ext>
+            </a:extLst>
+          </p:cNvPr>
+          <p:cNvSpPr txBox="1"/>
+          <p:nvPr/>
+        </p:nvSpPr>
+        <p:spPr>
+          <a:xfrm>
+            <a:off x="3744545" y="3828600"/>
+            <a:ext cx="670059" cy="369332"/>
+          </a:xfrm>
+          <a:prstGeom prst="rect">
+            <a:avLst/>
+          </a:prstGeom>
+          <a:noFill/>
+        </p:spPr>
+        <p:txBody>
+          <a:bodyPr wrap="square" rtlCol="0">
+            <a:spAutoFit/>
+          </a:bodyPr>
+          <a:lstStyle/>
+          <a:p>
+            <a:r>
+              <a:rPr lang="en-US" dirty="0">
+                <a:cs typeface="Times New Roman" panose="02020603050405020304" pitchFamily="18" charset="0"/>
+              </a:rPr>
+              <a:t>750</a:t>
+            </a:r>
+          </a:p>
+        </p:txBody>
+      </p:sp>
+      <p:sp>
+        <p:nvSpPr>
+          <p:cNvPr id="28" name="TextBox 27">
+            <a:extLst>
+              <a:ext uri="{FF2B5EF4-FFF2-40B4-BE49-F238E27FC236}">
+                <a16:creationId xmlns:a16="http://schemas.microsoft.com/office/drawing/2014/main" id="{BFBB765C-BEA7-4FF7-9665-8E7FABA4A535}"/>
+              </a:ext>
+            </a:extLst>
+          </p:cNvPr>
+          <p:cNvSpPr txBox="1"/>
+          <p:nvPr/>
+        </p:nvSpPr>
+        <p:spPr>
+          <a:xfrm>
+            <a:off x="4324455" y="2501148"/>
+            <a:ext cx="670059" cy="369332"/>
+          </a:xfrm>
+          <a:prstGeom prst="rect">
+            <a:avLst/>
+          </a:prstGeom>
+          <a:noFill/>
+        </p:spPr>
+        <p:txBody>
+          <a:bodyPr wrap="square" rtlCol="0">
+            <a:spAutoFit/>
+          </a:bodyPr>
+          <a:lstStyle/>
+          <a:p>
+            <a:r>
+              <a:rPr lang="en-US" dirty="0">
+                <a:cs typeface="Times New Roman" panose="02020603050405020304" pitchFamily="18" charset="0"/>
+              </a:rPr>
+              <a:t>200</a:t>
+            </a:r>
+          </a:p>
+        </p:txBody>
+      </p:sp>
+      <p:sp>
+        <p:nvSpPr>
+          <p:cNvPr id="29" name="TextBox 28">
+            <a:extLst>
+              <a:ext uri="{FF2B5EF4-FFF2-40B4-BE49-F238E27FC236}">
+                <a16:creationId xmlns:a16="http://schemas.microsoft.com/office/drawing/2014/main" id="{BE56B49B-5724-4E35-827D-8B1C4B94142E}"/>
+              </a:ext>
+            </a:extLst>
+          </p:cNvPr>
+          <p:cNvSpPr txBox="1"/>
+          <p:nvPr/>
+        </p:nvSpPr>
+        <p:spPr>
+          <a:xfrm>
+            <a:off x="3120088" y="2501148"/>
+            <a:ext cx="670059" cy="369332"/>
+          </a:xfrm>
+          <a:prstGeom prst="rect">
+            <a:avLst/>
+          </a:prstGeom>
+          <a:noFill/>
+        </p:spPr>
+        <p:txBody>
+          <a:bodyPr wrap="square" rtlCol="0">
+            <a:spAutoFit/>
+          </a:bodyPr>
+          <a:lstStyle/>
+          <a:p>
+            <a:r>
+              <a:rPr lang="en-US" dirty="0">
+                <a:cs typeface="Times New Roman" panose="02020603050405020304" pitchFamily="18" charset="0"/>
+              </a:rPr>
+              <a:t>200</a:t>
+            </a:r>
+          </a:p>
+        </p:txBody>
+      </p:sp>
+      <p:sp>
+        <p:nvSpPr>
+          <p:cNvPr id="30" name="TextBox 29">
+            <a:extLst>
+              <a:ext uri="{FF2B5EF4-FFF2-40B4-BE49-F238E27FC236}">
+                <a16:creationId xmlns:a16="http://schemas.microsoft.com/office/drawing/2014/main" id="{14BBF660-1E5E-46EF-A0FD-6281500ABA4D}"/>
+              </a:ext>
+            </a:extLst>
+          </p:cNvPr>
+          <p:cNvSpPr txBox="1"/>
+          <p:nvPr/>
+        </p:nvSpPr>
+        <p:spPr>
+          <a:xfrm>
+            <a:off x="4324456" y="1421765"/>
+            <a:ext cx="670059" cy="369332"/>
+          </a:xfrm>
+          <a:prstGeom prst="rect">
+            <a:avLst/>
+          </a:prstGeom>
+          <a:noFill/>
+        </p:spPr>
+        <p:txBody>
+          <a:bodyPr wrap="square" rtlCol="0">
+            <a:spAutoFit/>
+          </a:bodyPr>
+          <a:lstStyle/>
+          <a:p>
+            <a:r>
+              <a:rPr lang="en-US" dirty="0">
+                <a:cs typeface="Times New Roman" panose="02020603050405020304" pitchFamily="18" charset="0"/>
+              </a:rPr>
+              <a:t>200</a:t>
+            </a:r>
+          </a:p>
+        </p:txBody>
+      </p:sp>
+      <p:sp>
+        <p:nvSpPr>
+          <p:cNvPr id="31" name="TextBox 30">
+            <a:extLst>
+              <a:ext uri="{FF2B5EF4-FFF2-40B4-BE49-F238E27FC236}">
+                <a16:creationId xmlns:a16="http://schemas.microsoft.com/office/drawing/2014/main" id="{3DF7C741-4C1E-47A8-8E10-EE75FA9CEB4F}"/>
+              </a:ext>
+            </a:extLst>
+          </p:cNvPr>
+          <p:cNvSpPr txBox="1"/>
+          <p:nvPr/>
+        </p:nvSpPr>
+        <p:spPr>
+          <a:xfrm>
+            <a:off x="3125771" y="1527453"/>
+            <a:ext cx="670059" cy="369332"/>
+          </a:xfrm>
+          <a:prstGeom prst="rect">
+            <a:avLst/>
+          </a:prstGeom>
+          <a:noFill/>
+        </p:spPr>
+        <p:txBody>
+          <a:bodyPr wrap="square" rtlCol="0">
+            <a:spAutoFit/>
+          </a:bodyPr>
+          <a:lstStyle/>
+          <a:p>
+            <a:r>
+              <a:rPr lang="en-US" dirty="0">
+                <a:cs typeface="Times New Roman" panose="02020603050405020304" pitchFamily="18" charset="0"/>
+              </a:rPr>
+              <a:t>150</a:t>
+            </a:r>
+          </a:p>
+        </p:txBody>
+      </p:sp>
+      <p:sp>
+        <p:nvSpPr>
+          <p:cNvPr id="32" name="TextBox 31">
+            <a:extLst>
+              <a:ext uri="{FF2B5EF4-FFF2-40B4-BE49-F238E27FC236}">
+                <a16:creationId xmlns:a16="http://schemas.microsoft.com/office/drawing/2014/main" id="{EFBCB51A-942C-43D5-B47B-5569667A3549}"/>
+              </a:ext>
+            </a:extLst>
+          </p:cNvPr>
+          <p:cNvSpPr txBox="1"/>
+          <p:nvPr/>
+        </p:nvSpPr>
+        <p:spPr>
+          <a:xfrm>
+            <a:off x="5818019" y="1669593"/>
+            <a:ext cx="590895" cy="369332"/>
+          </a:xfrm>
+          <a:prstGeom prst="rect">
+            <a:avLst/>
+          </a:prstGeom>
+          <a:noFill/>
+        </p:spPr>
+        <p:txBody>
+          <a:bodyPr wrap="square" rtlCol="0">
+            <a:spAutoFit/>
+          </a:bodyPr>
+          <a:lstStyle/>
+          <a:p>
+            <a:r>
+              <a:rPr lang="en-US" dirty="0">
+                <a:cs typeface="Times New Roman" panose="02020603050405020304" pitchFamily="18" charset="0"/>
+              </a:rPr>
+              <a:t>300</a:t>
+            </a:r>
+          </a:p>
+        </p:txBody>
+      </p:sp>
+      <p:sp>
+        <p:nvSpPr>
+          <p:cNvPr id="33" name="TextBox 32">
+            <a:extLst>
+              <a:ext uri="{FF2B5EF4-FFF2-40B4-BE49-F238E27FC236}">
+                <a16:creationId xmlns:a16="http://schemas.microsoft.com/office/drawing/2014/main" id="{4CF28B72-9445-493F-9A04-ED2EBA43FA55}"/>
+              </a:ext>
+            </a:extLst>
+          </p:cNvPr>
+          <p:cNvSpPr txBox="1"/>
+          <p:nvPr/>
+        </p:nvSpPr>
+        <p:spPr>
+          <a:xfrm>
+            <a:off x="7112190" y="1669593"/>
+            <a:ext cx="590895" cy="369332"/>
+          </a:xfrm>
+          <a:prstGeom prst="rect">
+            <a:avLst/>
+          </a:prstGeom>
+          <a:noFill/>
+        </p:spPr>
+        <p:txBody>
+          <a:bodyPr wrap="square" rtlCol="0">
+            <a:spAutoFit/>
+          </a:bodyPr>
+          <a:lstStyle/>
+          <a:p>
+            <a:r>
+              <a:rPr lang="en-US" dirty="0">
+                <a:cs typeface="Times New Roman" panose="02020603050405020304" pitchFamily="18" charset="0"/>
+              </a:rPr>
+              <a:t>300</a:t>
+            </a:r>
+          </a:p>
+        </p:txBody>
+      </p:sp>
+      <p:sp>
+        <p:nvSpPr>
+          <p:cNvPr id="34" name="TextBox 33">
+            <a:extLst>
+              <a:ext uri="{FF2B5EF4-FFF2-40B4-BE49-F238E27FC236}">
+                <a16:creationId xmlns:a16="http://schemas.microsoft.com/office/drawing/2014/main" id="{BAB7C2A6-19A2-4D5E-BAC4-5F57F6C98B64}"/>
+              </a:ext>
+            </a:extLst>
+          </p:cNvPr>
+          <p:cNvSpPr txBox="1"/>
+          <p:nvPr/>
+        </p:nvSpPr>
+        <p:spPr>
+          <a:xfrm>
+            <a:off x="7093143" y="2856981"/>
+            <a:ext cx="590895" cy="369332"/>
+          </a:xfrm>
+          <a:prstGeom prst="rect">
+            <a:avLst/>
+          </a:prstGeom>
+          <a:noFill/>
+        </p:spPr>
+        <p:txBody>
+          <a:bodyPr wrap="square" rtlCol="0">
+            <a:spAutoFit/>
+          </a:bodyPr>
+          <a:lstStyle/>
+          <a:p>
+            <a:r>
+              <a:rPr lang="en-US" dirty="0">
+                <a:cs typeface="Times New Roman" panose="02020603050405020304" pitchFamily="18" charset="0"/>
+              </a:rPr>
+              <a:t>300</a:t>
+            </a:r>
+          </a:p>
+        </p:txBody>
+      </p:sp>
+      <p:sp>
+        <p:nvSpPr>
+          <p:cNvPr id="35" name="TextBox 34">
+            <a:extLst>
+              <a:ext uri="{FF2B5EF4-FFF2-40B4-BE49-F238E27FC236}">
+                <a16:creationId xmlns:a16="http://schemas.microsoft.com/office/drawing/2014/main" id="{435FDFD7-C6D0-43C0-8716-67C4437B9BCA}"/>
+              </a:ext>
+            </a:extLst>
+          </p:cNvPr>
+          <p:cNvSpPr txBox="1"/>
+          <p:nvPr/>
+        </p:nvSpPr>
+        <p:spPr>
+          <a:xfrm>
+            <a:off x="5831660" y="2856981"/>
+            <a:ext cx="590895" cy="369332"/>
+          </a:xfrm>
+          <a:prstGeom prst="rect">
+            <a:avLst/>
+          </a:prstGeom>
+          <a:noFill/>
+        </p:spPr>
+        <p:txBody>
+          <a:bodyPr wrap="square" rtlCol="0">
+            <a:spAutoFit/>
+          </a:bodyPr>
+          <a:lstStyle/>
+          <a:p>
+            <a:r>
+              <a:rPr lang="en-US" dirty="0">
+                <a:cs typeface="Times New Roman" panose="02020603050405020304" pitchFamily="18" charset="0"/>
+              </a:rPr>
+              <a:t>300</a:t>
+            </a:r>
+          </a:p>
+        </p:txBody>
+      </p:sp>
+      <p:sp>
+        <p:nvSpPr>
+          <p:cNvPr id="36" name="TextBox 35">
+            <a:extLst>
+              <a:ext uri="{FF2B5EF4-FFF2-40B4-BE49-F238E27FC236}">
+                <a16:creationId xmlns:a16="http://schemas.microsoft.com/office/drawing/2014/main" id="{1E286DE2-536E-45FB-9ED5-45D1928C92E6}"/>
+              </a:ext>
+            </a:extLst>
+          </p:cNvPr>
+          <p:cNvSpPr txBox="1"/>
+          <p:nvPr/>
+        </p:nvSpPr>
+        <p:spPr>
+          <a:xfrm>
+            <a:off x="6456978" y="3948773"/>
+            <a:ext cx="590895" cy="369332"/>
+          </a:xfrm>
+          <a:prstGeom prst="rect">
+            <a:avLst/>
+          </a:prstGeom>
+          <a:noFill/>
+        </p:spPr>
+        <p:txBody>
+          <a:bodyPr wrap="square" rtlCol="0">
+            <a:spAutoFit/>
+          </a:bodyPr>
+          <a:lstStyle/>
+          <a:p>
+            <a:r>
+              <a:rPr lang="en-US" dirty="0">
+                <a:cs typeface="Times New Roman" panose="02020603050405020304" pitchFamily="18" charset="0"/>
+              </a:rPr>
+              <a:t>300</a:t>
+            </a:r>
+          </a:p>
+        </p:txBody>
+      </p:sp>
+      <p:sp>
+        <p:nvSpPr>
+          <p:cNvPr id="37" name="Oval 36">
+            <a:extLst>
+              <a:ext uri="{FF2B5EF4-FFF2-40B4-BE49-F238E27FC236}">
+                <a16:creationId xmlns:a16="http://schemas.microsoft.com/office/drawing/2014/main" id="{3A6C0D26-72B8-4747-897A-056022C40989}"/>
+              </a:ext>
+            </a:extLst>
+          </p:cNvPr>
+          <p:cNvSpPr/>
+          <p:nvPr/>
+        </p:nvSpPr>
+        <p:spPr>
+          <a:xfrm>
+            <a:off x="10053441" y="934032"/>
+            <a:ext cx="359677" cy="341163"/>
+          </a:xfrm>
+          <a:prstGeom prst="ellipse">
+            <a:avLst/>
+          </a:prstGeom>
+          <a:noFill/>
+          <a:ln>
+            <a:solidFill>
+              <a:schemeClr val="tx1"/>
+            </a:solidFill>
+          </a:ln>
+        </p:spPr>
+        <p:style>
+          <a:lnRef idx="2">
+            <a:schemeClr val="accent1">
+              <a:shade val="50000"/>
+            </a:schemeClr>
+          </a:lnRef>
+          <a:fillRef idx="1">
+            <a:schemeClr val="accent1"/>
+          </a:fillRef>
+          <a:effectRef idx="0">
+            <a:schemeClr val="accent1"/>
+          </a:effectRef>
+          <a:fontRef idx="minor">
+            <a:schemeClr val="lt1"/>
+          </a:fontRef>
+        </p:style>
+        <p:txBody>
+          <a:bodyPr rtlCol="0" anchor="ctr"/>
+          <a:lstStyle/>
+          <a:p>
+            <a:pPr algn="ctr"/>
+            <a:endParaRPr lang="en-US"/>
+          </a:p>
+        </p:txBody>
+      </p:sp>
+      <p:sp>
+        <p:nvSpPr>
+          <p:cNvPr id="38" name="Oval 37">
+            <a:extLst>
+              <a:ext uri="{FF2B5EF4-FFF2-40B4-BE49-F238E27FC236}">
+                <a16:creationId xmlns:a16="http://schemas.microsoft.com/office/drawing/2014/main" id="{DD45F448-9779-4B34-A562-9367C74050AA}"/>
+              </a:ext>
+            </a:extLst>
+          </p:cNvPr>
+          <p:cNvSpPr/>
+          <p:nvPr/>
+        </p:nvSpPr>
+        <p:spPr>
+          <a:xfrm>
+            <a:off x="9907838" y="1477937"/>
+            <a:ext cx="634391" cy="598336"/>
+          </a:xfrm>
+          <a:prstGeom prst="ellipse">
+            <a:avLst/>
+          </a:prstGeom>
+          <a:noFill/>
+          <a:ln>
+            <a:solidFill>
+              <a:schemeClr val="tx1"/>
+            </a:solidFill>
+          </a:ln>
+        </p:spPr>
+        <p:style>
+          <a:lnRef idx="2">
+            <a:schemeClr val="accent1">
+              <a:shade val="50000"/>
+            </a:schemeClr>
+          </a:lnRef>
+          <a:fillRef idx="1">
+            <a:schemeClr val="accent1"/>
+          </a:fillRef>
+          <a:effectRef idx="0">
+            <a:schemeClr val="accent1"/>
+          </a:effectRef>
+          <a:fontRef idx="minor">
+            <a:schemeClr val="lt1"/>
+          </a:fontRef>
+        </p:style>
+        <p:txBody>
+          <a:bodyPr rtlCol="0" anchor="ctr"/>
+          <a:lstStyle/>
+          <a:p>
+            <a:pPr algn="ctr"/>
+            <a:endParaRPr lang="en-US"/>
+          </a:p>
+        </p:txBody>
+      </p:sp>
+      <p:sp>
+        <p:nvSpPr>
+          <p:cNvPr id="39" name="Oval 38">
+            <a:extLst>
+              <a:ext uri="{FF2B5EF4-FFF2-40B4-BE49-F238E27FC236}">
+                <a16:creationId xmlns:a16="http://schemas.microsoft.com/office/drawing/2014/main" id="{8887F4A7-CC12-46BE-B838-4B1A71E613B8}"/>
+              </a:ext>
+            </a:extLst>
+          </p:cNvPr>
+          <p:cNvSpPr/>
+          <p:nvPr/>
+        </p:nvSpPr>
+        <p:spPr>
+          <a:xfrm>
+            <a:off x="9907838" y="2319454"/>
+            <a:ext cx="634392" cy="598335"/>
+          </a:xfrm>
+          <a:prstGeom prst="ellipse">
+            <a:avLst/>
+          </a:prstGeom>
+          <a:noFill/>
+          <a:ln>
+            <a:solidFill>
+              <a:schemeClr val="tx1"/>
+            </a:solidFill>
+          </a:ln>
+        </p:spPr>
+        <p:style>
+          <a:lnRef idx="2">
+            <a:schemeClr val="accent1">
+              <a:shade val="50000"/>
+            </a:schemeClr>
+          </a:lnRef>
+          <a:fillRef idx="1">
+            <a:schemeClr val="accent1"/>
+          </a:fillRef>
+          <a:effectRef idx="0">
+            <a:schemeClr val="accent1"/>
+          </a:effectRef>
+          <a:fontRef idx="minor">
+            <a:schemeClr val="lt1"/>
+          </a:fontRef>
+        </p:style>
+        <p:txBody>
+          <a:bodyPr rtlCol="0" anchor="ctr"/>
+          <a:lstStyle/>
+          <a:p>
+            <a:pPr algn="ctr"/>
+            <a:endParaRPr lang="en-US"/>
+          </a:p>
+        </p:txBody>
+      </p:sp>
+      <p:sp>
+        <p:nvSpPr>
+          <p:cNvPr id="40" name="Oval 39">
+            <a:extLst>
+              <a:ext uri="{FF2B5EF4-FFF2-40B4-BE49-F238E27FC236}">
+                <a16:creationId xmlns:a16="http://schemas.microsoft.com/office/drawing/2014/main" id="{34CED167-17EC-4F27-AD49-F03DE615FFE7}"/>
+              </a:ext>
+            </a:extLst>
+          </p:cNvPr>
+          <p:cNvSpPr/>
+          <p:nvPr/>
+        </p:nvSpPr>
+        <p:spPr>
+          <a:xfrm>
+            <a:off x="9895249" y="3160794"/>
+            <a:ext cx="634391" cy="598335"/>
+          </a:xfrm>
+          <a:prstGeom prst="ellipse">
+            <a:avLst/>
+          </a:prstGeom>
+          <a:noFill/>
+          <a:ln>
+            <a:solidFill>
+              <a:schemeClr val="tx1"/>
+            </a:solidFill>
+          </a:ln>
+        </p:spPr>
+        <p:style>
+          <a:lnRef idx="2">
+            <a:schemeClr val="accent1">
+              <a:shade val="50000"/>
+            </a:schemeClr>
+          </a:lnRef>
+          <a:fillRef idx="1">
+            <a:schemeClr val="accent1"/>
+          </a:fillRef>
+          <a:effectRef idx="0">
+            <a:schemeClr val="accent1"/>
+          </a:effectRef>
+          <a:fontRef idx="minor">
+            <a:schemeClr val="lt1"/>
+          </a:fontRef>
+        </p:style>
+        <p:txBody>
+          <a:bodyPr rtlCol="0" anchor="ctr"/>
+          <a:lstStyle/>
+          <a:p>
+            <a:pPr algn="ctr"/>
+            <a:endParaRPr lang="en-US"/>
+          </a:p>
+        </p:txBody>
+      </p:sp>
+      <p:sp>
+        <p:nvSpPr>
+          <p:cNvPr id="41" name="Oval 40">
+            <a:extLst>
+              <a:ext uri="{FF2B5EF4-FFF2-40B4-BE49-F238E27FC236}">
+                <a16:creationId xmlns:a16="http://schemas.microsoft.com/office/drawing/2014/main" id="{3AC1BC05-0392-4D8A-B99A-0AC74DCFDACE}"/>
+              </a:ext>
+            </a:extLst>
+          </p:cNvPr>
+          <p:cNvSpPr/>
+          <p:nvPr/>
+        </p:nvSpPr>
+        <p:spPr>
+          <a:xfrm>
+            <a:off x="9207022" y="4002487"/>
+            <a:ext cx="1975968" cy="1862357"/>
+          </a:xfrm>
+          <a:prstGeom prst="ellipse">
+            <a:avLst/>
+          </a:prstGeom>
+          <a:noFill/>
+          <a:ln>
+            <a:solidFill>
+              <a:schemeClr val="tx1"/>
+            </a:solidFill>
+          </a:ln>
+        </p:spPr>
+        <p:style>
+          <a:lnRef idx="2">
+            <a:schemeClr val="accent1">
+              <a:shade val="50000"/>
+            </a:schemeClr>
+          </a:lnRef>
+          <a:fillRef idx="1">
+            <a:schemeClr val="accent1"/>
+          </a:fillRef>
+          <a:effectRef idx="0">
+            <a:schemeClr val="accent1"/>
+          </a:effectRef>
+          <a:fontRef idx="minor">
+            <a:schemeClr val="lt1"/>
+          </a:fontRef>
+        </p:style>
+        <p:txBody>
+          <a:bodyPr rtlCol="0" anchor="ctr"/>
+          <a:lstStyle/>
+          <a:p>
+            <a:pPr algn="ctr"/>
+            <a:endParaRPr lang="en-US"/>
+          </a:p>
+        </p:txBody>
+      </p:sp>
+      <p:sp>
+        <p:nvSpPr>
+          <p:cNvPr id="42" name="TextBox 41">
+            <a:extLst>
+              <a:ext uri="{FF2B5EF4-FFF2-40B4-BE49-F238E27FC236}">
+                <a16:creationId xmlns:a16="http://schemas.microsoft.com/office/drawing/2014/main" id="{595A2C09-1ECC-41AC-930B-59103E49C9E9}"/>
+              </a:ext>
+            </a:extLst>
+          </p:cNvPr>
+          <p:cNvSpPr txBox="1"/>
+          <p:nvPr/>
+        </p:nvSpPr>
+        <p:spPr>
+          <a:xfrm>
+            <a:off x="9609468" y="6230957"/>
+            <a:ext cx="1359016" cy="369332"/>
+          </a:xfrm>
+          <a:prstGeom prst="rect">
+            <a:avLst/>
+          </a:prstGeom>
+          <a:noFill/>
+        </p:spPr>
+        <p:txBody>
+          <a:bodyPr wrap="square" rtlCol="0">
+            <a:spAutoFit/>
+          </a:bodyPr>
+          <a:lstStyle/>
+          <a:p>
+            <a:r>
+              <a:rPr lang="en-US" b="1" dirty="0">
+                <a:cs typeface="Times New Roman" panose="02020603050405020304" pitchFamily="18" charset="0"/>
+              </a:rPr>
+              <a:t>Scenario 1</a:t>
+            </a:r>
+          </a:p>
+        </p:txBody>
+      </p:sp>
+      <p:cxnSp>
+        <p:nvCxnSpPr>
+          <p:cNvPr id="43" name="Straight Arrow Connector 42">
+            <a:extLst>
+              <a:ext uri="{FF2B5EF4-FFF2-40B4-BE49-F238E27FC236}">
+                <a16:creationId xmlns:a16="http://schemas.microsoft.com/office/drawing/2014/main" id="{FFEF21BD-CB21-4D10-BE86-ED7A98D67F36}"/>
+              </a:ext>
+            </a:extLst>
+          </p:cNvPr>
+          <p:cNvCxnSpPr>
+            <a:cxnSpLocks/>
+          </p:cNvCxnSpPr>
+          <p:nvPr/>
+        </p:nvCxnSpPr>
+        <p:spPr>
+          <a:xfrm flipH="1">
+            <a:off x="9277533" y="1104613"/>
+            <a:ext cx="839430" cy="0"/>
+          </a:xfrm>
+          <a:prstGeom prst="straightConnector1">
+            <a:avLst/>
+          </a:prstGeom>
+          <a:ln>
+            <a:tailEnd type="triangle"/>
+          </a:ln>
+        </p:spPr>
+        <p:style>
+          <a:lnRef idx="2">
+            <a:schemeClr val="dk1"/>
+          </a:lnRef>
+          <a:fillRef idx="0">
+            <a:schemeClr val="dk1"/>
+          </a:fillRef>
+          <a:effectRef idx="1">
+            <a:schemeClr val="dk1"/>
+          </a:effectRef>
+          <a:fontRef idx="minor">
+            <a:schemeClr val="tx1"/>
+          </a:fontRef>
+        </p:style>
+      </p:cxnSp>
+      <p:cxnSp>
+        <p:nvCxnSpPr>
+          <p:cNvPr id="44" name="Straight Arrow Connector 43">
+            <a:extLst>
+              <a:ext uri="{FF2B5EF4-FFF2-40B4-BE49-F238E27FC236}">
+                <a16:creationId xmlns:a16="http://schemas.microsoft.com/office/drawing/2014/main" id="{7868160F-E038-44D0-ACCD-FD21A38B274D}"/>
+              </a:ext>
+            </a:extLst>
+          </p:cNvPr>
+          <p:cNvCxnSpPr>
+            <a:cxnSpLocks/>
+          </p:cNvCxnSpPr>
+          <p:nvPr/>
+        </p:nvCxnSpPr>
+        <p:spPr>
+          <a:xfrm flipH="1">
+            <a:off x="9207022" y="1797767"/>
+            <a:ext cx="839430" cy="0"/>
+          </a:xfrm>
+          <a:prstGeom prst="straightConnector1">
+            <a:avLst/>
+          </a:prstGeom>
+          <a:ln>
+            <a:tailEnd type="triangle"/>
+          </a:ln>
+        </p:spPr>
+        <p:style>
+          <a:lnRef idx="2">
+            <a:schemeClr val="dk1"/>
+          </a:lnRef>
+          <a:fillRef idx="0">
+            <a:schemeClr val="dk1"/>
+          </a:fillRef>
+          <a:effectRef idx="1">
+            <a:schemeClr val="dk1"/>
+          </a:effectRef>
+          <a:fontRef idx="minor">
+            <a:schemeClr val="tx1"/>
+          </a:fontRef>
+        </p:style>
+      </p:cxnSp>
+      <p:cxnSp>
+        <p:nvCxnSpPr>
+          <p:cNvPr id="45" name="Straight Arrow Connector 44">
+            <a:extLst>
+              <a:ext uri="{FF2B5EF4-FFF2-40B4-BE49-F238E27FC236}">
+                <a16:creationId xmlns:a16="http://schemas.microsoft.com/office/drawing/2014/main" id="{9591012D-CEF2-42DC-9DA7-8A0641531F27}"/>
+              </a:ext>
+            </a:extLst>
+          </p:cNvPr>
+          <p:cNvCxnSpPr>
+            <a:cxnSpLocks/>
+          </p:cNvCxnSpPr>
+          <p:nvPr/>
+        </p:nvCxnSpPr>
+        <p:spPr>
+          <a:xfrm flipH="1">
+            <a:off x="9158087" y="2639283"/>
+            <a:ext cx="839430" cy="0"/>
+          </a:xfrm>
+          <a:prstGeom prst="straightConnector1">
+            <a:avLst/>
+          </a:prstGeom>
+          <a:ln>
+            <a:tailEnd type="triangle"/>
+          </a:ln>
+        </p:spPr>
+        <p:style>
+          <a:lnRef idx="2">
+            <a:schemeClr val="dk1"/>
+          </a:lnRef>
+          <a:fillRef idx="0">
+            <a:schemeClr val="dk1"/>
+          </a:fillRef>
+          <a:effectRef idx="1">
+            <a:schemeClr val="dk1"/>
+          </a:effectRef>
+          <a:fontRef idx="minor">
+            <a:schemeClr val="tx1"/>
+          </a:fontRef>
+        </p:style>
+      </p:cxnSp>
+      <p:cxnSp>
+        <p:nvCxnSpPr>
+          <p:cNvPr id="46" name="Straight Arrow Connector 45">
+            <a:extLst>
+              <a:ext uri="{FF2B5EF4-FFF2-40B4-BE49-F238E27FC236}">
+                <a16:creationId xmlns:a16="http://schemas.microsoft.com/office/drawing/2014/main" id="{17089DE6-4A48-4E46-9519-4723526E081F}"/>
+              </a:ext>
+            </a:extLst>
+          </p:cNvPr>
+          <p:cNvCxnSpPr>
+            <a:cxnSpLocks/>
+          </p:cNvCxnSpPr>
+          <p:nvPr/>
+        </p:nvCxnSpPr>
+        <p:spPr>
+          <a:xfrm flipH="1">
+            <a:off x="9158087" y="3480623"/>
+            <a:ext cx="839430" cy="0"/>
+          </a:xfrm>
+          <a:prstGeom prst="straightConnector1">
+            <a:avLst/>
+          </a:prstGeom>
+          <a:ln>
+            <a:tailEnd type="triangle"/>
+          </a:ln>
+        </p:spPr>
+        <p:style>
+          <a:lnRef idx="2">
+            <a:schemeClr val="dk1"/>
+          </a:lnRef>
+          <a:fillRef idx="0">
+            <a:schemeClr val="dk1"/>
+          </a:fillRef>
+          <a:effectRef idx="1">
+            <a:schemeClr val="dk1"/>
+          </a:effectRef>
+          <a:fontRef idx="minor">
+            <a:schemeClr val="tx1"/>
+          </a:fontRef>
+        </p:style>
+      </p:cxnSp>
+      <p:cxnSp>
+        <p:nvCxnSpPr>
+          <p:cNvPr id="47" name="Straight Arrow Connector 46">
+            <a:extLst>
+              <a:ext uri="{FF2B5EF4-FFF2-40B4-BE49-F238E27FC236}">
+                <a16:creationId xmlns:a16="http://schemas.microsoft.com/office/drawing/2014/main" id="{4A27DF67-2294-446E-A96B-721C3CD984F0}"/>
+              </a:ext>
+            </a:extLst>
+          </p:cNvPr>
+          <p:cNvCxnSpPr>
+            <a:cxnSpLocks/>
+          </p:cNvCxnSpPr>
+          <p:nvPr/>
+        </p:nvCxnSpPr>
+        <p:spPr>
+          <a:xfrm flipH="1">
+            <a:off x="8837324" y="4997978"/>
+            <a:ext cx="839430" cy="0"/>
+          </a:xfrm>
+          <a:prstGeom prst="straightConnector1">
+            <a:avLst/>
+          </a:prstGeom>
+          <a:ln>
+            <a:tailEnd type="triangle"/>
+          </a:ln>
+        </p:spPr>
+        <p:style>
+          <a:lnRef idx="2">
+            <a:schemeClr val="dk1"/>
+          </a:lnRef>
+          <a:fillRef idx="0">
+            <a:schemeClr val="dk1"/>
+          </a:fillRef>
+          <a:effectRef idx="1">
+            <a:schemeClr val="dk1"/>
+          </a:effectRef>
+          <a:fontRef idx="minor">
+            <a:schemeClr val="tx1"/>
+          </a:fontRef>
+        </p:style>
+      </p:cxnSp>
+      <p:cxnSp>
+        <p:nvCxnSpPr>
+          <p:cNvPr id="48" name="Straight Arrow Connector 47">
+            <a:extLst>
+              <a:ext uri="{FF2B5EF4-FFF2-40B4-BE49-F238E27FC236}">
+                <a16:creationId xmlns:a16="http://schemas.microsoft.com/office/drawing/2014/main" id="{85DC8A18-4CBB-43C9-B8F5-302A62495CB2}"/>
+              </a:ext>
+            </a:extLst>
+          </p:cNvPr>
+          <p:cNvCxnSpPr>
+            <a:cxnSpLocks/>
+          </p:cNvCxnSpPr>
+          <p:nvPr/>
+        </p:nvCxnSpPr>
+        <p:spPr>
+          <a:xfrm flipV="1">
+            <a:off x="10355654" y="1113693"/>
+            <a:ext cx="788555" cy="1"/>
+          </a:xfrm>
+          <a:prstGeom prst="straightConnector1">
+            <a:avLst/>
+          </a:prstGeom>
+          <a:ln>
+            <a:tailEnd type="triangle"/>
+          </a:ln>
+        </p:spPr>
+        <p:style>
+          <a:lnRef idx="2">
+            <a:schemeClr val="accent3"/>
+          </a:lnRef>
+          <a:fillRef idx="0">
+            <a:schemeClr val="accent3"/>
+          </a:fillRef>
+          <a:effectRef idx="1">
+            <a:schemeClr val="accent3"/>
+          </a:effectRef>
+          <a:fontRef idx="minor">
+            <a:schemeClr val="tx1"/>
+          </a:fontRef>
+        </p:style>
+      </p:cxnSp>
+      <p:cxnSp>
+        <p:nvCxnSpPr>
+          <p:cNvPr id="49" name="Straight Arrow Connector 48">
+            <a:extLst>
+              <a:ext uri="{FF2B5EF4-FFF2-40B4-BE49-F238E27FC236}">
+                <a16:creationId xmlns:a16="http://schemas.microsoft.com/office/drawing/2014/main" id="{79746847-0346-4E62-9FBC-0A19DDE733E3}"/>
+              </a:ext>
+            </a:extLst>
+          </p:cNvPr>
+          <p:cNvCxnSpPr>
+            <a:cxnSpLocks/>
+          </p:cNvCxnSpPr>
+          <p:nvPr/>
+        </p:nvCxnSpPr>
+        <p:spPr>
+          <a:xfrm flipV="1">
+            <a:off x="10450544" y="1804682"/>
+            <a:ext cx="788555" cy="1"/>
+          </a:xfrm>
+          <a:prstGeom prst="straightConnector1">
+            <a:avLst/>
+          </a:prstGeom>
+          <a:ln>
+            <a:tailEnd type="triangle"/>
+          </a:ln>
+        </p:spPr>
+        <p:style>
+          <a:lnRef idx="2">
+            <a:schemeClr val="accent3"/>
+          </a:lnRef>
+          <a:fillRef idx="0">
+            <a:schemeClr val="accent3"/>
+          </a:fillRef>
+          <a:effectRef idx="1">
+            <a:schemeClr val="accent3"/>
+          </a:effectRef>
+          <a:fontRef idx="minor">
+            <a:schemeClr val="tx1"/>
+          </a:fontRef>
+        </p:style>
+      </p:cxnSp>
+      <p:cxnSp>
+        <p:nvCxnSpPr>
+          <p:cNvPr id="50" name="Straight Arrow Connector 49">
+            <a:extLst>
+              <a:ext uri="{FF2B5EF4-FFF2-40B4-BE49-F238E27FC236}">
+                <a16:creationId xmlns:a16="http://schemas.microsoft.com/office/drawing/2014/main" id="{5A45C100-E1AF-4E8D-81CE-0AF13BA6C780}"/>
+              </a:ext>
+            </a:extLst>
+          </p:cNvPr>
+          <p:cNvCxnSpPr>
+            <a:cxnSpLocks/>
+          </p:cNvCxnSpPr>
+          <p:nvPr/>
+        </p:nvCxnSpPr>
+        <p:spPr>
+          <a:xfrm flipV="1">
+            <a:off x="10450545" y="2641941"/>
+            <a:ext cx="788555" cy="1"/>
+          </a:xfrm>
+          <a:prstGeom prst="straightConnector1">
+            <a:avLst/>
+          </a:prstGeom>
+          <a:ln>
+            <a:tailEnd type="triangle"/>
+          </a:ln>
+        </p:spPr>
+        <p:style>
+          <a:lnRef idx="2">
+            <a:schemeClr val="accent3"/>
+          </a:lnRef>
+          <a:fillRef idx="0">
+            <a:schemeClr val="accent3"/>
+          </a:fillRef>
+          <a:effectRef idx="1">
+            <a:schemeClr val="accent3"/>
+          </a:effectRef>
+          <a:fontRef idx="minor">
+            <a:schemeClr val="tx1"/>
+          </a:fontRef>
+        </p:style>
+      </p:cxnSp>
+      <p:cxnSp>
+        <p:nvCxnSpPr>
+          <p:cNvPr id="51" name="Straight Arrow Connector 50">
+            <a:extLst>
+              <a:ext uri="{FF2B5EF4-FFF2-40B4-BE49-F238E27FC236}">
+                <a16:creationId xmlns:a16="http://schemas.microsoft.com/office/drawing/2014/main" id="{6AB06074-65C9-41BC-849D-29EC67173E3E}"/>
+              </a:ext>
+            </a:extLst>
+          </p:cNvPr>
+          <p:cNvCxnSpPr>
+            <a:cxnSpLocks/>
+          </p:cNvCxnSpPr>
+          <p:nvPr/>
+        </p:nvCxnSpPr>
+        <p:spPr>
+          <a:xfrm flipV="1">
+            <a:off x="10413118" y="3486411"/>
+            <a:ext cx="788555" cy="1"/>
+          </a:xfrm>
+          <a:prstGeom prst="straightConnector1">
+            <a:avLst/>
+          </a:prstGeom>
+          <a:ln>
+            <a:tailEnd type="triangle"/>
+          </a:ln>
+        </p:spPr>
+        <p:style>
+          <a:lnRef idx="2">
+            <a:schemeClr val="accent3"/>
+          </a:lnRef>
+          <a:fillRef idx="0">
+            <a:schemeClr val="accent3"/>
+          </a:fillRef>
+          <a:effectRef idx="1">
+            <a:schemeClr val="accent3"/>
+          </a:effectRef>
+          <a:fontRef idx="minor">
+            <a:schemeClr val="tx1"/>
+          </a:fontRef>
+        </p:style>
+      </p:cxnSp>
+      <p:cxnSp>
+        <p:nvCxnSpPr>
+          <p:cNvPr id="52" name="Straight Arrow Connector 51">
+            <a:extLst>
+              <a:ext uri="{FF2B5EF4-FFF2-40B4-BE49-F238E27FC236}">
+                <a16:creationId xmlns:a16="http://schemas.microsoft.com/office/drawing/2014/main" id="{DF80AE12-B052-45E5-8B4C-7DDE3313579E}"/>
+              </a:ext>
+            </a:extLst>
+          </p:cNvPr>
+          <p:cNvCxnSpPr>
+            <a:cxnSpLocks/>
+          </p:cNvCxnSpPr>
+          <p:nvPr/>
+        </p:nvCxnSpPr>
+        <p:spPr>
+          <a:xfrm flipV="1">
+            <a:off x="10714708" y="4997978"/>
+            <a:ext cx="788555" cy="1"/>
+          </a:xfrm>
+          <a:prstGeom prst="straightConnector1">
+            <a:avLst/>
+          </a:prstGeom>
+          <a:ln>
+            <a:tailEnd type="triangle"/>
+          </a:ln>
+        </p:spPr>
+        <p:style>
+          <a:lnRef idx="2">
+            <a:schemeClr val="accent3"/>
+          </a:lnRef>
+          <a:fillRef idx="0">
+            <a:schemeClr val="accent3"/>
+          </a:fillRef>
+          <a:effectRef idx="1">
+            <a:schemeClr val="accent3"/>
+          </a:effectRef>
+          <a:fontRef idx="minor">
+            <a:schemeClr val="tx1"/>
+          </a:fontRef>
+        </p:style>
+      </p:cxnSp>
+      <p:sp>
+        <p:nvSpPr>
+          <p:cNvPr id="53" name="TextBox 52">
+            <a:extLst>
+              <a:ext uri="{FF2B5EF4-FFF2-40B4-BE49-F238E27FC236}">
+                <a16:creationId xmlns:a16="http://schemas.microsoft.com/office/drawing/2014/main" id="{A034B64C-148D-4B00-AAB6-A10BD976DDAE}"/>
+              </a:ext>
+            </a:extLst>
+          </p:cNvPr>
+          <p:cNvSpPr txBox="1"/>
+          <p:nvPr/>
+        </p:nvSpPr>
+        <p:spPr>
+          <a:xfrm>
+            <a:off x="10403748" y="411236"/>
+            <a:ext cx="1788252" cy="369332"/>
+          </a:xfrm>
+          <a:prstGeom prst="rect">
+            <a:avLst/>
+          </a:prstGeom>
+          <a:noFill/>
+        </p:spPr>
+        <p:txBody>
+          <a:bodyPr wrap="square" rtlCol="0">
+            <a:spAutoFit/>
+          </a:bodyPr>
+          <a:lstStyle/>
+          <a:p>
+            <a:r>
+              <a:rPr lang="en-US" b="1" dirty="0">
+                <a:cs typeface="Times New Roman" panose="02020603050405020304" pitchFamily="18" charset="0"/>
+              </a:rPr>
+              <a:t>Proportional</a:t>
+            </a:r>
+            <a:endParaRPr lang="en-US" sz="2400" b="1" dirty="0">
+              <a:cs typeface="Times New Roman" panose="02020603050405020304" pitchFamily="18" charset="0"/>
+            </a:endParaRPr>
+          </a:p>
+        </p:txBody>
+      </p:sp>
+      <p:sp>
+        <p:nvSpPr>
+          <p:cNvPr id="54" name="TextBox 53">
+            <a:extLst>
+              <a:ext uri="{FF2B5EF4-FFF2-40B4-BE49-F238E27FC236}">
+                <a16:creationId xmlns:a16="http://schemas.microsoft.com/office/drawing/2014/main" id="{61FBAC4E-8C8C-4E4D-9C48-501C4B7E7149}"/>
+              </a:ext>
+            </a:extLst>
+          </p:cNvPr>
+          <p:cNvSpPr txBox="1"/>
+          <p:nvPr/>
+        </p:nvSpPr>
+        <p:spPr>
+          <a:xfrm>
+            <a:off x="8946795" y="420567"/>
+            <a:ext cx="823985" cy="369332"/>
+          </a:xfrm>
+          <a:prstGeom prst="rect">
+            <a:avLst/>
+          </a:prstGeom>
+          <a:noFill/>
+        </p:spPr>
+        <p:txBody>
+          <a:bodyPr wrap="square" rtlCol="0">
+            <a:spAutoFit/>
+          </a:bodyPr>
+          <a:lstStyle/>
+          <a:p>
+            <a:r>
+              <a:rPr lang="en-US" b="1" dirty="0">
+                <a:cs typeface="Times New Roman" panose="02020603050405020304" pitchFamily="18" charset="0"/>
+              </a:rPr>
+              <a:t>Equal</a:t>
+            </a:r>
+          </a:p>
+        </p:txBody>
+      </p:sp>
+      <p:sp>
+        <p:nvSpPr>
+          <p:cNvPr id="55" name="TextBox 54">
+            <a:extLst>
+              <a:ext uri="{FF2B5EF4-FFF2-40B4-BE49-F238E27FC236}">
+                <a16:creationId xmlns:a16="http://schemas.microsoft.com/office/drawing/2014/main" id="{61822C36-A96F-4326-8A16-C43E3831F667}"/>
+              </a:ext>
+            </a:extLst>
+          </p:cNvPr>
+          <p:cNvSpPr txBox="1"/>
+          <p:nvPr/>
+        </p:nvSpPr>
+        <p:spPr>
+          <a:xfrm>
+            <a:off x="10007922" y="910706"/>
+            <a:ext cx="562108" cy="369332"/>
+          </a:xfrm>
+          <a:prstGeom prst="rect">
+            <a:avLst/>
+          </a:prstGeom>
+          <a:noFill/>
+        </p:spPr>
+        <p:txBody>
+          <a:bodyPr wrap="square" rtlCol="0">
+            <a:spAutoFit/>
+          </a:bodyPr>
+          <a:lstStyle/>
+          <a:p>
+            <a:r>
+              <a:rPr lang="en-US" dirty="0">
+                <a:cs typeface="Times New Roman" panose="02020603050405020304" pitchFamily="18" charset="0"/>
+              </a:rPr>
+              <a:t>30</a:t>
+            </a:r>
+            <a:endParaRPr lang="en-US" sz="1200" dirty="0">
+              <a:cs typeface="Times New Roman" panose="02020603050405020304" pitchFamily="18" charset="0"/>
+            </a:endParaRPr>
+          </a:p>
+        </p:txBody>
+      </p:sp>
+      <p:sp>
+        <p:nvSpPr>
+          <p:cNvPr id="56" name="TextBox 55">
+            <a:extLst>
+              <a:ext uri="{FF2B5EF4-FFF2-40B4-BE49-F238E27FC236}">
+                <a16:creationId xmlns:a16="http://schemas.microsoft.com/office/drawing/2014/main" id="{4B859DEB-D33D-4D95-98A5-A61C997F5D2F}"/>
+              </a:ext>
+            </a:extLst>
+          </p:cNvPr>
+          <p:cNvSpPr txBox="1"/>
+          <p:nvPr/>
+        </p:nvSpPr>
+        <p:spPr>
+          <a:xfrm>
+            <a:off x="9939918" y="1585101"/>
+            <a:ext cx="776859" cy="369332"/>
+          </a:xfrm>
+          <a:prstGeom prst="rect">
+            <a:avLst/>
+          </a:prstGeom>
+          <a:noFill/>
+        </p:spPr>
+        <p:txBody>
+          <a:bodyPr wrap="square" rtlCol="0">
+            <a:spAutoFit/>
+          </a:bodyPr>
+          <a:lstStyle/>
+          <a:p>
+            <a:r>
+              <a:rPr lang="en-US" dirty="0">
+                <a:cs typeface="Times New Roman" panose="02020603050405020304" pitchFamily="18" charset="0"/>
+              </a:rPr>
+              <a:t>100</a:t>
+            </a:r>
+            <a:endParaRPr lang="en-US" sz="2000" dirty="0">
+              <a:cs typeface="Times New Roman" panose="02020603050405020304" pitchFamily="18" charset="0"/>
+            </a:endParaRPr>
+          </a:p>
+        </p:txBody>
+      </p:sp>
+      <p:sp>
+        <p:nvSpPr>
+          <p:cNvPr id="57" name="TextBox 56">
+            <a:extLst>
+              <a:ext uri="{FF2B5EF4-FFF2-40B4-BE49-F238E27FC236}">
+                <a16:creationId xmlns:a16="http://schemas.microsoft.com/office/drawing/2014/main" id="{23911972-0D33-45A8-9FC1-EE3D20D89B78}"/>
+              </a:ext>
+            </a:extLst>
+          </p:cNvPr>
+          <p:cNvSpPr txBox="1"/>
+          <p:nvPr/>
+        </p:nvSpPr>
+        <p:spPr>
+          <a:xfrm>
+            <a:off x="9929599" y="2436274"/>
+            <a:ext cx="626336" cy="369332"/>
+          </a:xfrm>
+          <a:prstGeom prst="rect">
+            <a:avLst/>
+          </a:prstGeom>
+          <a:noFill/>
+        </p:spPr>
+        <p:txBody>
+          <a:bodyPr wrap="square" rtlCol="0">
+            <a:spAutoFit/>
+          </a:bodyPr>
+          <a:lstStyle/>
+          <a:p>
+            <a:r>
+              <a:rPr lang="en-US" dirty="0">
+                <a:cs typeface="Times New Roman" panose="02020603050405020304" pitchFamily="18" charset="0"/>
+              </a:rPr>
+              <a:t>100</a:t>
+            </a:r>
+          </a:p>
+        </p:txBody>
+      </p:sp>
+      <p:sp>
+        <p:nvSpPr>
+          <p:cNvPr id="58" name="TextBox 57">
+            <a:extLst>
+              <a:ext uri="{FF2B5EF4-FFF2-40B4-BE49-F238E27FC236}">
+                <a16:creationId xmlns:a16="http://schemas.microsoft.com/office/drawing/2014/main" id="{DC1D50FE-5A58-40BA-8B41-02DFA5F33125}"/>
+              </a:ext>
+            </a:extLst>
+          </p:cNvPr>
+          <p:cNvSpPr txBox="1"/>
+          <p:nvPr/>
+        </p:nvSpPr>
+        <p:spPr>
+          <a:xfrm>
+            <a:off x="9917916" y="3268767"/>
+            <a:ext cx="682306" cy="369332"/>
+          </a:xfrm>
+          <a:prstGeom prst="rect">
+            <a:avLst/>
+          </a:prstGeom>
+          <a:noFill/>
+        </p:spPr>
+        <p:txBody>
+          <a:bodyPr wrap="square" rtlCol="0">
+            <a:spAutoFit/>
+          </a:bodyPr>
+          <a:lstStyle/>
+          <a:p>
+            <a:r>
+              <a:rPr lang="en-US" dirty="0">
+                <a:cs typeface="Times New Roman" panose="02020603050405020304" pitchFamily="18" charset="0"/>
+              </a:rPr>
+              <a:t>100</a:t>
+            </a:r>
+            <a:endParaRPr lang="en-US" sz="1400" dirty="0">
+              <a:cs typeface="Times New Roman" panose="02020603050405020304" pitchFamily="18" charset="0"/>
+            </a:endParaRPr>
+          </a:p>
+        </p:txBody>
+      </p:sp>
+      <p:sp>
+        <p:nvSpPr>
+          <p:cNvPr id="59" name="TextBox 58">
+            <a:extLst>
+              <a:ext uri="{FF2B5EF4-FFF2-40B4-BE49-F238E27FC236}">
+                <a16:creationId xmlns:a16="http://schemas.microsoft.com/office/drawing/2014/main" id="{F8EFAAD7-BCB9-47E2-9A72-5C9EBB44EAF5}"/>
+              </a:ext>
+            </a:extLst>
+          </p:cNvPr>
+          <p:cNvSpPr txBox="1"/>
+          <p:nvPr/>
+        </p:nvSpPr>
+        <p:spPr>
+          <a:xfrm>
+            <a:off x="9822086" y="4797923"/>
+            <a:ext cx="839429" cy="369332"/>
+          </a:xfrm>
+          <a:prstGeom prst="rect">
+            <a:avLst/>
+          </a:prstGeom>
+          <a:noFill/>
+        </p:spPr>
+        <p:txBody>
+          <a:bodyPr wrap="square" rtlCol="0">
+            <a:spAutoFit/>
+          </a:bodyPr>
+          <a:lstStyle/>
+          <a:p>
+            <a:r>
+              <a:rPr lang="en-US" dirty="0">
+                <a:cs typeface="Times New Roman" panose="02020603050405020304" pitchFamily="18" charset="0"/>
+              </a:rPr>
+              <a:t>1170</a:t>
+            </a:r>
+          </a:p>
+        </p:txBody>
+      </p:sp>
+      <p:sp>
+        <p:nvSpPr>
+          <p:cNvPr id="60" name="TextBox 59">
+            <a:extLst>
+              <a:ext uri="{FF2B5EF4-FFF2-40B4-BE49-F238E27FC236}">
+                <a16:creationId xmlns:a16="http://schemas.microsoft.com/office/drawing/2014/main" id="{DA6E75ED-96F6-4522-A976-407C2C48BAB4}"/>
+              </a:ext>
+            </a:extLst>
+          </p:cNvPr>
+          <p:cNvSpPr txBox="1"/>
+          <p:nvPr/>
+        </p:nvSpPr>
+        <p:spPr>
+          <a:xfrm>
+            <a:off x="11152551" y="3291759"/>
+            <a:ext cx="464723" cy="369332"/>
+          </a:xfrm>
+          <a:prstGeom prst="rect">
+            <a:avLst/>
+          </a:prstGeom>
+          <a:noFill/>
+        </p:spPr>
+        <p:txBody>
+          <a:bodyPr wrap="square" rtlCol="0">
+            <a:spAutoFit/>
+          </a:bodyPr>
+          <a:lstStyle/>
+          <a:p>
+            <a:r>
+              <a:rPr lang="en-US" dirty="0">
+                <a:cs typeface="Times New Roman" panose="02020603050405020304" pitchFamily="18" charset="0"/>
+              </a:rPr>
+              <a:t>10</a:t>
+            </a:r>
+          </a:p>
+        </p:txBody>
+      </p:sp>
+      <p:sp>
+        <p:nvSpPr>
+          <p:cNvPr id="61" name="TextBox 60">
+            <a:extLst>
+              <a:ext uri="{FF2B5EF4-FFF2-40B4-BE49-F238E27FC236}">
+                <a16:creationId xmlns:a16="http://schemas.microsoft.com/office/drawing/2014/main" id="{4CCA4391-2783-4FD1-BF4F-DBE15609760E}"/>
+              </a:ext>
+            </a:extLst>
+          </p:cNvPr>
+          <p:cNvSpPr txBox="1"/>
+          <p:nvPr/>
+        </p:nvSpPr>
+        <p:spPr>
+          <a:xfrm>
+            <a:off x="11374855" y="4803981"/>
+            <a:ext cx="873556" cy="369332"/>
+          </a:xfrm>
+          <a:prstGeom prst="rect">
+            <a:avLst/>
+          </a:prstGeom>
+          <a:noFill/>
+        </p:spPr>
+        <p:txBody>
+          <a:bodyPr wrap="square" rtlCol="0">
+            <a:spAutoFit/>
+          </a:bodyPr>
+          <a:lstStyle/>
+          <a:p>
+            <a:r>
+              <a:rPr lang="en-US" dirty="0">
+                <a:cs typeface="Times New Roman" panose="02020603050405020304" pitchFamily="18" charset="0"/>
+              </a:rPr>
+              <a:t>117</a:t>
+            </a:r>
+            <a:endParaRPr lang="en-US" sz="1600" dirty="0">
+              <a:cs typeface="Times New Roman" panose="02020603050405020304" pitchFamily="18" charset="0"/>
+            </a:endParaRPr>
+          </a:p>
+        </p:txBody>
+      </p:sp>
+      <p:sp>
+        <p:nvSpPr>
+          <p:cNvPr id="62" name="TextBox 61">
+            <a:extLst>
+              <a:ext uri="{FF2B5EF4-FFF2-40B4-BE49-F238E27FC236}">
+                <a16:creationId xmlns:a16="http://schemas.microsoft.com/office/drawing/2014/main" id="{C31F1C95-6BB6-49D5-8351-AC80AAA0A31A}"/>
+              </a:ext>
+            </a:extLst>
+          </p:cNvPr>
+          <p:cNvSpPr txBox="1"/>
+          <p:nvPr/>
+        </p:nvSpPr>
+        <p:spPr>
+          <a:xfrm>
+            <a:off x="11211668" y="2462405"/>
+            <a:ext cx="464723" cy="369332"/>
+          </a:xfrm>
+          <a:prstGeom prst="rect">
+            <a:avLst/>
+          </a:prstGeom>
+          <a:noFill/>
+        </p:spPr>
+        <p:txBody>
+          <a:bodyPr wrap="square" rtlCol="0">
+            <a:spAutoFit/>
+          </a:bodyPr>
+          <a:lstStyle/>
+          <a:p>
+            <a:r>
+              <a:rPr lang="en-US" dirty="0">
+                <a:cs typeface="Times New Roman" panose="02020603050405020304" pitchFamily="18" charset="0"/>
+              </a:rPr>
+              <a:t>10</a:t>
+            </a:r>
+          </a:p>
+        </p:txBody>
+      </p:sp>
+      <p:sp>
+        <p:nvSpPr>
+          <p:cNvPr id="63" name="TextBox 62">
+            <a:extLst>
+              <a:ext uri="{FF2B5EF4-FFF2-40B4-BE49-F238E27FC236}">
+                <a16:creationId xmlns:a16="http://schemas.microsoft.com/office/drawing/2014/main" id="{4C81D15A-3265-4D7A-B08D-1D50631F127B}"/>
+              </a:ext>
+            </a:extLst>
+          </p:cNvPr>
+          <p:cNvSpPr txBox="1"/>
+          <p:nvPr/>
+        </p:nvSpPr>
+        <p:spPr>
+          <a:xfrm>
+            <a:off x="11182989" y="1619458"/>
+            <a:ext cx="464723" cy="369332"/>
+          </a:xfrm>
+          <a:prstGeom prst="rect">
+            <a:avLst/>
+          </a:prstGeom>
+          <a:noFill/>
+        </p:spPr>
+        <p:txBody>
+          <a:bodyPr wrap="square" rtlCol="0">
+            <a:spAutoFit/>
+          </a:bodyPr>
+          <a:lstStyle/>
+          <a:p>
+            <a:r>
+              <a:rPr lang="en-US" dirty="0">
+                <a:cs typeface="Times New Roman" panose="02020603050405020304" pitchFamily="18" charset="0"/>
+              </a:rPr>
+              <a:t>10</a:t>
+            </a:r>
+          </a:p>
+        </p:txBody>
+      </p:sp>
+      <p:sp>
+        <p:nvSpPr>
+          <p:cNvPr id="64" name="TextBox 63">
+            <a:extLst>
+              <a:ext uri="{FF2B5EF4-FFF2-40B4-BE49-F238E27FC236}">
+                <a16:creationId xmlns:a16="http://schemas.microsoft.com/office/drawing/2014/main" id="{79F977F9-E2EA-4BAC-A685-4291A6F1E9E2}"/>
+              </a:ext>
+            </a:extLst>
+          </p:cNvPr>
+          <p:cNvSpPr txBox="1"/>
+          <p:nvPr/>
+        </p:nvSpPr>
+        <p:spPr>
+          <a:xfrm>
+            <a:off x="11108986" y="917515"/>
+            <a:ext cx="464723" cy="369332"/>
+          </a:xfrm>
+          <a:prstGeom prst="rect">
+            <a:avLst/>
+          </a:prstGeom>
+          <a:noFill/>
+        </p:spPr>
+        <p:txBody>
+          <a:bodyPr wrap="square" rtlCol="0">
+            <a:spAutoFit/>
+          </a:bodyPr>
+          <a:lstStyle/>
+          <a:p>
+            <a:r>
+              <a:rPr lang="en-US" dirty="0">
+                <a:cs typeface="Times New Roman" panose="02020603050405020304" pitchFamily="18" charset="0"/>
+              </a:rPr>
+              <a:t>3</a:t>
+            </a:r>
+          </a:p>
+        </p:txBody>
+      </p:sp>
+      <p:sp>
+        <p:nvSpPr>
+          <p:cNvPr id="65" name="TextBox 64">
+            <a:extLst>
+              <a:ext uri="{FF2B5EF4-FFF2-40B4-BE49-F238E27FC236}">
+                <a16:creationId xmlns:a16="http://schemas.microsoft.com/office/drawing/2014/main" id="{60294A0E-23CC-4CC3-BA1F-686B88E07F32}"/>
+              </a:ext>
+            </a:extLst>
+          </p:cNvPr>
+          <p:cNvSpPr txBox="1"/>
+          <p:nvPr/>
+        </p:nvSpPr>
+        <p:spPr>
+          <a:xfrm>
+            <a:off x="8894065" y="934032"/>
+            <a:ext cx="464723" cy="369332"/>
+          </a:xfrm>
+          <a:prstGeom prst="rect">
+            <a:avLst/>
+          </a:prstGeom>
+          <a:noFill/>
+        </p:spPr>
+        <p:txBody>
+          <a:bodyPr wrap="square" rtlCol="0">
+            <a:spAutoFit/>
+          </a:bodyPr>
+          <a:lstStyle/>
+          <a:p>
+            <a:r>
+              <a:rPr lang="en-US" dirty="0">
+                <a:cs typeface="Times New Roman" panose="02020603050405020304" pitchFamily="18" charset="0"/>
+              </a:rPr>
+              <a:t>30</a:t>
+            </a:r>
+          </a:p>
+        </p:txBody>
+      </p:sp>
+      <p:sp>
+        <p:nvSpPr>
+          <p:cNvPr id="66" name="TextBox 65">
+            <a:extLst>
+              <a:ext uri="{FF2B5EF4-FFF2-40B4-BE49-F238E27FC236}">
+                <a16:creationId xmlns:a16="http://schemas.microsoft.com/office/drawing/2014/main" id="{25CE85B9-6A7B-45CF-8479-130FB993AFB7}"/>
+              </a:ext>
+            </a:extLst>
+          </p:cNvPr>
+          <p:cNvSpPr txBox="1"/>
+          <p:nvPr/>
+        </p:nvSpPr>
+        <p:spPr>
+          <a:xfrm>
+            <a:off x="8837324" y="1604529"/>
+            <a:ext cx="464723" cy="369332"/>
+          </a:xfrm>
+          <a:prstGeom prst="rect">
+            <a:avLst/>
+          </a:prstGeom>
+          <a:noFill/>
+        </p:spPr>
+        <p:txBody>
+          <a:bodyPr wrap="square" rtlCol="0">
+            <a:spAutoFit/>
+          </a:bodyPr>
+          <a:lstStyle/>
+          <a:p>
+            <a:r>
+              <a:rPr lang="en-US" dirty="0">
+                <a:cs typeface="Times New Roman" panose="02020603050405020304" pitchFamily="18" charset="0"/>
+              </a:rPr>
+              <a:t>30</a:t>
+            </a:r>
+          </a:p>
+        </p:txBody>
+      </p:sp>
+      <p:sp>
+        <p:nvSpPr>
+          <p:cNvPr id="67" name="TextBox 66">
+            <a:extLst>
+              <a:ext uri="{FF2B5EF4-FFF2-40B4-BE49-F238E27FC236}">
+                <a16:creationId xmlns:a16="http://schemas.microsoft.com/office/drawing/2014/main" id="{EFE16224-2EF1-49C5-A06D-F5A83BA2F196}"/>
+              </a:ext>
+            </a:extLst>
+          </p:cNvPr>
+          <p:cNvSpPr txBox="1"/>
+          <p:nvPr/>
+        </p:nvSpPr>
+        <p:spPr>
+          <a:xfrm>
+            <a:off x="8775266" y="2450243"/>
+            <a:ext cx="464723" cy="369332"/>
+          </a:xfrm>
+          <a:prstGeom prst="rect">
+            <a:avLst/>
+          </a:prstGeom>
+          <a:noFill/>
+        </p:spPr>
+        <p:txBody>
+          <a:bodyPr wrap="square" rtlCol="0">
+            <a:spAutoFit/>
+          </a:bodyPr>
+          <a:lstStyle/>
+          <a:p>
+            <a:r>
+              <a:rPr lang="en-US" dirty="0">
+                <a:cs typeface="Times New Roman" panose="02020603050405020304" pitchFamily="18" charset="0"/>
+              </a:rPr>
+              <a:t>30</a:t>
+            </a:r>
+            <a:endParaRPr lang="en-US" sz="1600" dirty="0">
+              <a:cs typeface="Times New Roman" panose="02020603050405020304" pitchFamily="18" charset="0"/>
+            </a:endParaRPr>
+          </a:p>
+        </p:txBody>
+      </p:sp>
+      <p:sp>
+        <p:nvSpPr>
+          <p:cNvPr id="68" name="TextBox 67">
+            <a:extLst>
+              <a:ext uri="{FF2B5EF4-FFF2-40B4-BE49-F238E27FC236}">
+                <a16:creationId xmlns:a16="http://schemas.microsoft.com/office/drawing/2014/main" id="{2A5B2A4F-CDB4-45A4-9C8F-8E8B1743A63B}"/>
+              </a:ext>
+            </a:extLst>
+          </p:cNvPr>
+          <p:cNvSpPr txBox="1"/>
+          <p:nvPr/>
+        </p:nvSpPr>
+        <p:spPr>
+          <a:xfrm>
+            <a:off x="8770760" y="3291759"/>
+            <a:ext cx="464723" cy="369332"/>
+          </a:xfrm>
+          <a:prstGeom prst="rect">
+            <a:avLst/>
+          </a:prstGeom>
+          <a:noFill/>
+        </p:spPr>
+        <p:txBody>
+          <a:bodyPr wrap="square" rtlCol="0">
+            <a:spAutoFit/>
+          </a:bodyPr>
+          <a:lstStyle/>
+          <a:p>
+            <a:r>
+              <a:rPr lang="en-US" dirty="0">
+                <a:cs typeface="Times New Roman" panose="02020603050405020304" pitchFamily="18" charset="0"/>
+              </a:rPr>
+              <a:t>30</a:t>
+            </a:r>
+          </a:p>
+        </p:txBody>
+      </p:sp>
+      <p:sp>
+        <p:nvSpPr>
+          <p:cNvPr id="69" name="TextBox 68">
+            <a:extLst>
+              <a:ext uri="{FF2B5EF4-FFF2-40B4-BE49-F238E27FC236}">
+                <a16:creationId xmlns:a16="http://schemas.microsoft.com/office/drawing/2014/main" id="{FC8AE0B1-FD03-48B8-A15A-38966E7F7FE9}"/>
+              </a:ext>
+            </a:extLst>
+          </p:cNvPr>
+          <p:cNvSpPr txBox="1"/>
+          <p:nvPr/>
+        </p:nvSpPr>
+        <p:spPr>
+          <a:xfrm>
+            <a:off x="8441453" y="4813312"/>
+            <a:ext cx="464723" cy="369332"/>
+          </a:xfrm>
+          <a:prstGeom prst="rect">
+            <a:avLst/>
+          </a:prstGeom>
+          <a:noFill/>
+        </p:spPr>
+        <p:txBody>
+          <a:bodyPr wrap="square" rtlCol="0">
+            <a:spAutoFit/>
+          </a:bodyPr>
+          <a:lstStyle/>
+          <a:p>
+            <a:r>
+              <a:rPr lang="en-US" dirty="0">
+                <a:cs typeface="Times New Roman" panose="02020603050405020304" pitchFamily="18" charset="0"/>
+              </a:rPr>
+              <a:t>30</a:t>
+            </a:r>
+          </a:p>
+        </p:txBody>
+      </p:sp>
+      <p:cxnSp>
+        <p:nvCxnSpPr>
+          <p:cNvPr id="79" name="Straight Connector 78">
+            <a:extLst>
+              <a:ext uri="{FF2B5EF4-FFF2-40B4-BE49-F238E27FC236}">
+                <a16:creationId xmlns:a16="http://schemas.microsoft.com/office/drawing/2014/main" id="{30832729-60E0-4B6A-8B9E-416340D3A14E}"/>
+              </a:ext>
+            </a:extLst>
+          </p:cNvPr>
+          <p:cNvCxnSpPr>
+            <a:cxnSpLocks/>
+          </p:cNvCxnSpPr>
+          <p:nvPr/>
+        </p:nvCxnSpPr>
+        <p:spPr>
+          <a:xfrm>
+            <a:off x="8145710" y="75501"/>
+            <a:ext cx="77227" cy="6711193"/>
+          </a:xfrm>
+          <a:prstGeom prst="line">
+            <a:avLst/>
+          </a:prstGeom>
+        </p:spPr>
+        <p:style>
+          <a:lnRef idx="1">
+            <a:schemeClr val="accent3"/>
+          </a:lnRef>
+          <a:fillRef idx="0">
+            <a:schemeClr val="accent3"/>
+          </a:fillRef>
+          <a:effectRef idx="0">
+            <a:schemeClr val="accent3"/>
+          </a:effectRef>
+          <a:fontRef idx="minor">
+            <a:schemeClr val="tx1"/>
+          </a:fontRef>
+        </p:style>
+      </p:cxnSp>
+    </p:spTree>
+    <p:extLst>
+      <p:ext uri="{BB962C8B-B14F-4D97-AF65-F5344CB8AC3E}">
+        <p14:creationId xmlns:p14="http://schemas.microsoft.com/office/powerpoint/2010/main" val="587213661"/>
+      </p:ext>
+    </p:extLst>
+  </p:cSld>
+  <p:clrMapOvr>
+    <a:masterClrMapping/>
+  </p:clrMapOvr>
+</p:sld>
+</file>
+
 <file path=ppt/theme/theme1.xml><?xml version="1.0" encoding="utf-8"?>
 <a:theme xmlns:a="http://schemas.openxmlformats.org/drawingml/2006/main" name="Office Theme">
   <a:themeElements>

</xml_diff>